<commit_message>
updating grading policy for group project.
</commit_message>
<xml_diff>
--- a/slides/dailyAnnouncements.pptx
+++ b/slides/dailyAnnouncements.pptx
@@ -5,10 +5,10 @@
     <p:sldMasterId id="2147483648" r:id="rId1"/>
   </p:sldMasterIdLst>
   <p:notesMasterIdLst>
-    <p:notesMasterId r:id="rId7"/>
+    <p:notesMasterId r:id="rId8"/>
   </p:notesMasterIdLst>
   <p:handoutMasterIdLst>
-    <p:handoutMasterId r:id="rId8"/>
+    <p:handoutMasterId r:id="rId9"/>
   </p:handoutMasterIdLst>
   <p:sldIdLst>
     <p:sldId id="283" r:id="rId2"/>
@@ -16,6 +16,7 @@
     <p:sldId id="287" r:id="rId4"/>
     <p:sldId id="288" r:id="rId5"/>
     <p:sldId id="289" r:id="rId6"/>
+    <p:sldId id="290" r:id="rId7"/>
   </p:sldIdLst>
   <p:sldSz cx="9144000" cy="6858000" type="screen4x3"/>
   <p:notesSz cx="7099300" cy="9385300"/>
@@ -4689,6 +4690,173 @@
     <p:extLst>
       <p:ext uri="{BB962C8B-B14F-4D97-AF65-F5344CB8AC3E}">
         <p14:creationId xmlns:p14="http://schemas.microsoft.com/office/powerpoint/2010/main" val="2542556573"/>
+      </p:ext>
+    </p:extLst>
+  </p:cSld>
+  <p:clrMapOvr>
+    <a:masterClrMapping/>
+  </p:clrMapOvr>
+</p:sld>
+</file>
+
+<file path=ppt/slides/slide6.xml><?xml version="1.0" encoding="utf-8"?>
+<p:sld xmlns:a="http://schemas.openxmlformats.org/drawingml/2006/main" xmlns:r="http://schemas.openxmlformats.org/officeDocument/2006/relationships" xmlns:p="http://schemas.openxmlformats.org/presentationml/2006/main">
+  <p:cSld>
+    <p:spTree>
+      <p:nvGrpSpPr>
+        <p:cNvPr id="1" name=""/>
+        <p:cNvGrpSpPr/>
+        <p:nvPr/>
+      </p:nvGrpSpPr>
+      <p:grpSpPr>
+        <a:xfrm>
+          <a:off x="0" y="0"/>
+          <a:ext cx="0" cy="0"/>
+          <a:chOff x="0" y="0"/>
+          <a:chExt cx="0" cy="0"/>
+        </a:xfrm>
+      </p:grpSpPr>
+      <p:sp>
+        <p:nvSpPr>
+          <p:cNvPr id="2" name="Title 1"/>
+          <p:cNvSpPr>
+            <a:spLocks noGrp="1"/>
+          </p:cNvSpPr>
+          <p:nvPr>
+            <p:ph type="title"/>
+          </p:nvPr>
+        </p:nvSpPr>
+        <p:spPr/>
+        <p:txBody>
+          <a:bodyPr/>
+          <a:lstStyle/>
+          <a:p>
+            <a:r>
+              <a:rPr lang="en-US" dirty="0"/>
+              <a:t>Monday, February 3</a:t>
+            </a:r>
+          </a:p>
+        </p:txBody>
+      </p:sp>
+      <p:sp>
+        <p:nvSpPr>
+          <p:cNvPr id="3" name="Content Placeholder 2"/>
+          <p:cNvSpPr>
+            <a:spLocks noGrp="1"/>
+          </p:cNvSpPr>
+          <p:nvPr>
+            <p:ph idx="1"/>
+          </p:nvPr>
+        </p:nvSpPr>
+        <p:spPr/>
+        <p:txBody>
+          <a:bodyPr/>
+          <a:lstStyle/>
+          <a:p>
+            <a:r>
+              <a:rPr lang="en-US" sz="2600" b="1" i="1" dirty="0" err="1"/>
+              <a:t>Floryanator</a:t>
+            </a:r>
+            <a:r>
+              <a:rPr lang="en-US" sz="2600" dirty="0"/>
+              <a:t> is concerned</a:t>
+            </a:r>
+          </a:p>
+          <a:p>
+            <a:pPr lvl="1"/>
+            <a:r>
+              <a:rPr lang="en-US" sz="1800" dirty="0"/>
+              <a:t>HW 1 was graded, and the grades were….not good. </a:t>
+            </a:r>
+          </a:p>
+          <a:p>
+            <a:pPr lvl="1"/>
+            <a:r>
+              <a:rPr lang="en-US" sz="1800" dirty="0"/>
+              <a:t>Initial thought: Take one more week to get hw1 and 2 perfect. Push all else back</a:t>
+            </a:r>
+            <a:endParaRPr lang="en-US" sz="2200" dirty="0"/>
+          </a:p>
+          <a:p>
+            <a:r>
+              <a:rPr lang="en-US" sz="2600" b="1" i="1" dirty="0"/>
+              <a:t>Homework this week </a:t>
+            </a:r>
+            <a:r>
+              <a:rPr lang="en-US" sz="2600" dirty="0"/>
+              <a:t>is dependent on discussion above</a:t>
+            </a:r>
+          </a:p>
+          <a:p>
+            <a:r>
+              <a:rPr lang="en-US" sz="2600" b="1" i="1" dirty="0"/>
+              <a:t>Lecture today:</a:t>
+            </a:r>
+          </a:p>
+          <a:p>
+            <a:pPr lvl="1"/>
+            <a:r>
+              <a:rPr lang="en-US" sz="1800" dirty="0"/>
+              <a:t>We can spend some time going over </a:t>
+            </a:r>
+            <a:r>
+              <a:rPr lang="en-US" sz="1800" dirty="0" err="1"/>
+              <a:t>AffineTransform</a:t>
+            </a:r>
+            <a:r>
+              <a:rPr lang="en-US" sz="1800" dirty="0"/>
+              <a:t> again, how to implement and piece everything together in more detail today if you want.</a:t>
+            </a:r>
+          </a:p>
+          <a:p>
+            <a:r>
+              <a:rPr lang="en-US" sz="2600" dirty="0"/>
+              <a:t>Going to skip poison today, too much else to discuss.</a:t>
+            </a:r>
+          </a:p>
+          <a:p>
+            <a:r>
+              <a:rPr lang="en-US" sz="2600" dirty="0"/>
+              <a:t>Policy change going forward:</a:t>
+            </a:r>
+          </a:p>
+          <a:p>
+            <a:pPr lvl="1"/>
+            <a:r>
+              <a:rPr lang="en-US" sz="2200" dirty="0"/>
+              <a:t>For group project, 2/2 is considered passing. If you don’t earn at least a 1 on initial submission, then you can’t resubmit to raise the grade. This will help ensure everyone puts effort in by intended deadline.</a:t>
+            </a:r>
+          </a:p>
+        </p:txBody>
+      </p:sp>
+      <p:sp>
+        <p:nvSpPr>
+          <p:cNvPr id="4" name="Footer Placeholder 3"/>
+          <p:cNvSpPr>
+            <a:spLocks noGrp="1"/>
+          </p:cNvSpPr>
+          <p:nvPr>
+            <p:ph type="ftr" sz="quarter" idx="10"/>
+          </p:nvPr>
+        </p:nvSpPr>
+        <p:spPr/>
+        <p:txBody>
+          <a:bodyPr/>
+          <a:lstStyle/>
+          <a:p>
+            <a:fld id="{D0357299-C40C-42AB-B0C0-2E6E0A5A7F61}" type="slidenum">
+              <a:rPr lang="en-US" altLang="zh-CN" smtClean="0"/>
+              <a:pPr/>
+              <a:t>6</a:t>
+            </a:fld>
+            <a:endParaRPr lang="en-US" altLang="zh-CN"/>
+          </a:p>
+        </p:txBody>
+      </p:sp>
+    </p:spTree>
+    <p:extLst>
+      <p:ext uri="{BB962C8B-B14F-4D97-AF65-F5344CB8AC3E}">
+        <p14:creationId xmlns:p14="http://schemas.microsoft.com/office/powerpoint/2010/main" val="3286361728"/>
       </p:ext>
     </p:extLst>
   </p:cSld>

</xml_diff>

<commit_message>
announcements and lecture updates
</commit_message>
<xml_diff>
--- a/slides/dailyAnnouncements.pptx
+++ b/slides/dailyAnnouncements.pptx
@@ -5,10 +5,10 @@
     <p:sldMasterId id="2147483648" r:id="rId1"/>
   </p:sldMasterIdLst>
   <p:notesMasterIdLst>
-    <p:notesMasterId r:id="rId8"/>
+    <p:notesMasterId r:id="rId9"/>
   </p:notesMasterIdLst>
   <p:handoutMasterIdLst>
-    <p:handoutMasterId r:id="rId9"/>
+    <p:handoutMasterId r:id="rId10"/>
   </p:handoutMasterIdLst>
   <p:sldIdLst>
     <p:sldId id="283" r:id="rId2"/>
@@ -17,6 +17,7 @@
     <p:sldId id="288" r:id="rId5"/>
     <p:sldId id="289" r:id="rId6"/>
     <p:sldId id="290" r:id="rId7"/>
+    <p:sldId id="291" r:id="rId8"/>
   </p:sldIdLst>
   <p:sldSz cx="9144000" cy="6858000" type="screen4x3"/>
   <p:notesSz cx="7099300" cy="9385300"/>
@@ -4857,6 +4858,167 @@
     <p:extLst>
       <p:ext uri="{BB962C8B-B14F-4D97-AF65-F5344CB8AC3E}">
         <p14:creationId xmlns:p14="http://schemas.microsoft.com/office/powerpoint/2010/main" val="3286361728"/>
+      </p:ext>
+    </p:extLst>
+  </p:cSld>
+  <p:clrMapOvr>
+    <a:masterClrMapping/>
+  </p:clrMapOvr>
+</p:sld>
+</file>
+
+<file path=ppt/slides/slide7.xml><?xml version="1.0" encoding="utf-8"?>
+<p:sld xmlns:a="http://schemas.openxmlformats.org/drawingml/2006/main" xmlns:r="http://schemas.openxmlformats.org/officeDocument/2006/relationships" xmlns:p="http://schemas.openxmlformats.org/presentationml/2006/main">
+  <p:cSld>
+    <p:spTree>
+      <p:nvGrpSpPr>
+        <p:cNvPr id="1" name=""/>
+        <p:cNvGrpSpPr/>
+        <p:nvPr/>
+      </p:nvGrpSpPr>
+      <p:grpSpPr>
+        <a:xfrm>
+          <a:off x="0" y="0"/>
+          <a:ext cx="0" cy="0"/>
+          <a:chOff x="0" y="0"/>
+          <a:chExt cx="0" cy="0"/>
+        </a:xfrm>
+      </p:grpSpPr>
+      <p:sp>
+        <p:nvSpPr>
+          <p:cNvPr id="2" name="Title 1"/>
+          <p:cNvSpPr>
+            <a:spLocks noGrp="1"/>
+          </p:cNvSpPr>
+          <p:nvPr>
+            <p:ph type="title"/>
+          </p:nvPr>
+        </p:nvSpPr>
+        <p:spPr/>
+        <p:txBody>
+          <a:bodyPr/>
+          <a:lstStyle/>
+          <a:p>
+            <a:r>
+              <a:rPr lang="en-US" dirty="0"/>
+              <a:t>Wednesday, February 5</a:t>
+            </a:r>
+          </a:p>
+        </p:txBody>
+      </p:sp>
+      <p:sp>
+        <p:nvSpPr>
+          <p:cNvPr id="3" name="Content Placeholder 2"/>
+          <p:cNvSpPr>
+            <a:spLocks noGrp="1"/>
+          </p:cNvSpPr>
+          <p:nvPr>
+            <p:ph idx="1"/>
+          </p:nvPr>
+        </p:nvSpPr>
+        <p:spPr/>
+        <p:txBody>
+          <a:bodyPr/>
+          <a:lstStyle/>
+          <a:p>
+            <a:r>
+              <a:rPr lang="en-US" sz="2600" dirty="0"/>
+              <a:t>We have a </a:t>
+            </a:r>
+            <a:r>
+              <a:rPr lang="en-US" sz="2600" b="1" i="1" dirty="0"/>
+              <a:t>plan</a:t>
+            </a:r>
+            <a:r>
+              <a:rPr lang="en-US" sz="2600" dirty="0"/>
+              <a:t> for hw2. Remember to get that submitted to me, TA, or on Collab by Friday. </a:t>
+            </a:r>
+            <a:endParaRPr lang="en-US" sz="1800" dirty="0"/>
+          </a:p>
+          <a:p>
+            <a:r>
+              <a:rPr lang="en-US" sz="2600" dirty="0"/>
+              <a:t>Back to poison things today</a:t>
+            </a:r>
+          </a:p>
+          <a:p>
+            <a:r>
+              <a:rPr lang="en-US" sz="2600" dirty="0"/>
+              <a:t>Lab this week:</a:t>
+            </a:r>
+          </a:p>
+          <a:p>
+            <a:pPr lvl="1"/>
+            <a:r>
+              <a:rPr lang="en-US" sz="2200" dirty="0"/>
+              <a:t>Finish and show off hw2 code. Reshuffle groups.</a:t>
+            </a:r>
+          </a:p>
+          <a:p>
+            <a:r>
+              <a:rPr lang="en-US" sz="2600" dirty="0"/>
+              <a:t>Policy change going forward:</a:t>
+            </a:r>
+          </a:p>
+          <a:p>
+            <a:pPr lvl="1"/>
+            <a:r>
+              <a:rPr lang="en-US" sz="2200" dirty="0"/>
+              <a:t>For group project, 2/2 is considered passing. If you don’t earn at least a 1 on initial submission, then you can’t resubmit to raise the grade. This will help ensure everyone puts effort in by intended deadline.</a:t>
+            </a:r>
+          </a:p>
+          <a:p>
+            <a:r>
+              <a:rPr lang="en-US" sz="2600" dirty="0"/>
+              <a:t>Lecture today is finishing </a:t>
+            </a:r>
+            <a:r>
+              <a:rPr lang="en-US" sz="2600" b="1" i="1" dirty="0"/>
+              <a:t>What is a game</a:t>
+            </a:r>
+            <a:r>
+              <a:rPr lang="en-US" sz="2600" dirty="0"/>
+              <a:t>? and then talking about </a:t>
+            </a:r>
+            <a:r>
+              <a:rPr lang="en-US" sz="2600" b="1" i="1" dirty="0"/>
+              <a:t>character design</a:t>
+            </a:r>
+            <a:r>
+              <a:rPr lang="en-US" sz="2600" dirty="0"/>
+              <a:t>.</a:t>
+            </a:r>
+          </a:p>
+        </p:txBody>
+      </p:sp>
+      <p:sp>
+        <p:nvSpPr>
+          <p:cNvPr id="4" name="Footer Placeholder 3"/>
+          <p:cNvSpPr>
+            <a:spLocks noGrp="1"/>
+          </p:cNvSpPr>
+          <p:nvPr>
+            <p:ph type="ftr" sz="quarter" idx="10"/>
+          </p:nvPr>
+        </p:nvSpPr>
+        <p:spPr/>
+        <p:txBody>
+          <a:bodyPr/>
+          <a:lstStyle/>
+          <a:p>
+            <a:fld id="{D0357299-C40C-42AB-B0C0-2E6E0A5A7F61}" type="slidenum">
+              <a:rPr lang="en-US" altLang="zh-CN" smtClean="0"/>
+              <a:pPr/>
+              <a:t>7</a:t>
+            </a:fld>
+            <a:endParaRPr lang="en-US" altLang="zh-CN"/>
+          </a:p>
+        </p:txBody>
+      </p:sp>
+    </p:spTree>
+    <p:extLst>
+      <p:ext uri="{BB962C8B-B14F-4D97-AF65-F5344CB8AC3E}">
+        <p14:creationId xmlns:p14="http://schemas.microsoft.com/office/powerpoint/2010/main" val="1185574925"/>
       </p:ext>
     </p:extLst>
   </p:cSld>

</xml_diff>

<commit_message>
rebuild slides page and clearing out daily announcements
</commit_message>
<xml_diff>
--- a/slides/dailyAnnouncements.pptx
+++ b/slides/dailyAnnouncements.pptx
@@ -5,24 +5,14 @@
     <p:sldMasterId id="2147483648" r:id="rId1"/>
   </p:sldMasterIdLst>
   <p:notesMasterIdLst>
-    <p:notesMasterId r:id="rId14"/>
+    <p:notesMasterId r:id="rId4"/>
   </p:notesMasterIdLst>
   <p:handoutMasterIdLst>
-    <p:handoutMasterId r:id="rId15"/>
+    <p:handoutMasterId r:id="rId5"/>
   </p:handoutMasterIdLst>
   <p:sldIdLst>
     <p:sldId id="283" r:id="rId2"/>
     <p:sldId id="286" r:id="rId3"/>
-    <p:sldId id="287" r:id="rId4"/>
-    <p:sldId id="288" r:id="rId5"/>
-    <p:sldId id="289" r:id="rId6"/>
-    <p:sldId id="290" r:id="rId7"/>
-    <p:sldId id="291" r:id="rId8"/>
-    <p:sldId id="292" r:id="rId9"/>
-    <p:sldId id="293" r:id="rId10"/>
-    <p:sldId id="294" r:id="rId11"/>
-    <p:sldId id="295" r:id="rId12"/>
-    <p:sldId id="296" r:id="rId13"/>
   </p:sldIdLst>
   <p:sldSz cx="9144000" cy="6858000" type="screen4x3"/>
   <p:notesSz cx="7099300" cy="9385300"/>
@@ -4006,528 +3996,6 @@
 </p:sld>
 </file>
 
-<file path=ppt/slides/slide10.xml><?xml version="1.0" encoding="utf-8"?>
-<p:sld xmlns:a="http://schemas.openxmlformats.org/drawingml/2006/main" xmlns:r="http://schemas.openxmlformats.org/officeDocument/2006/relationships" xmlns:p="http://schemas.openxmlformats.org/presentationml/2006/main">
-  <p:cSld>
-    <p:spTree>
-      <p:nvGrpSpPr>
-        <p:cNvPr id="1" name=""/>
-        <p:cNvGrpSpPr/>
-        <p:nvPr/>
-      </p:nvGrpSpPr>
-      <p:grpSpPr>
-        <a:xfrm>
-          <a:off x="0" y="0"/>
-          <a:ext cx="0" cy="0"/>
-          <a:chOff x="0" y="0"/>
-          <a:chExt cx="0" cy="0"/>
-        </a:xfrm>
-      </p:grpSpPr>
-      <p:sp>
-        <p:nvSpPr>
-          <p:cNvPr id="2" name="Title 1"/>
-          <p:cNvSpPr>
-            <a:spLocks noGrp="1"/>
-          </p:cNvSpPr>
-          <p:nvPr>
-            <p:ph type="title"/>
-          </p:nvPr>
-        </p:nvSpPr>
-        <p:spPr/>
-        <p:txBody>
-          <a:bodyPr/>
-          <a:lstStyle/>
-          <a:p>
-            <a:r>
-              <a:rPr lang="en-US" dirty="0"/>
-              <a:t>Monday, February 17</a:t>
-            </a:r>
-          </a:p>
-        </p:txBody>
-      </p:sp>
-      <p:sp>
-        <p:nvSpPr>
-          <p:cNvPr id="3" name="Content Placeholder 2"/>
-          <p:cNvSpPr>
-            <a:spLocks noGrp="1"/>
-          </p:cNvSpPr>
-          <p:nvPr>
-            <p:ph idx="1"/>
-          </p:nvPr>
-        </p:nvSpPr>
-        <p:spPr/>
-        <p:txBody>
-          <a:bodyPr/>
-          <a:lstStyle/>
-          <a:p>
-            <a:r>
-              <a:rPr lang="en-US" sz="2600" dirty="0"/>
-              <a:t>It is our understanding that the two individual </a:t>
-            </a:r>
-            <a:r>
-              <a:rPr lang="en-US" sz="2600" dirty="0" err="1"/>
-              <a:t>homeworks</a:t>
-            </a:r>
-            <a:r>
-              <a:rPr lang="en-US" sz="2600" dirty="0"/>
-              <a:t> are all graded and returned</a:t>
-            </a:r>
-            <a:r>
-              <a:rPr lang="en-US" sz="2200" dirty="0"/>
-              <a:t>.</a:t>
-            </a:r>
-          </a:p>
-          <a:p>
-            <a:pPr lvl="1"/>
-            <a:r>
-              <a:rPr lang="en-US" sz="1800" dirty="0"/>
-              <a:t>If anything doesn’t look right, notify me or a TA asap so we can correct it. </a:t>
-            </a:r>
-            <a:endParaRPr lang="en-US" sz="2600" dirty="0"/>
-          </a:p>
-          <a:p>
-            <a:r>
-              <a:rPr lang="en-US" sz="2600" dirty="0"/>
-              <a:t>Lab this week:</a:t>
-            </a:r>
-          </a:p>
-          <a:p>
-            <a:pPr lvl="1"/>
-            <a:r>
-              <a:rPr lang="en-US" sz="2200" dirty="0"/>
-              <a:t>First presentations will happen this week.</a:t>
-            </a:r>
-          </a:p>
-          <a:p>
-            <a:pPr lvl="1"/>
-            <a:r>
-              <a:rPr lang="en-US" sz="2200" dirty="0"/>
-              <a:t>Format: One group randomly selected each week without replacement. You should give a ~10-15 minute, informal presentation on your game. This can include:</a:t>
-            </a:r>
-          </a:p>
-          <a:p>
-            <a:pPr lvl="2"/>
-            <a:r>
-              <a:rPr lang="en-US" sz="1800" dirty="0"/>
-              <a:t>Showing your design documents and discussing your progress on what your game will be like.</a:t>
-            </a:r>
-          </a:p>
-          <a:p>
-            <a:pPr lvl="2"/>
-            <a:r>
-              <a:rPr lang="en-US" sz="1800" dirty="0"/>
-              <a:t>Showing off demos of your prototype as it comes together. Etc.</a:t>
-            </a:r>
-          </a:p>
-          <a:p>
-            <a:pPr lvl="2"/>
-            <a:r>
-              <a:rPr lang="en-US" sz="1800" dirty="0"/>
-              <a:t>Then, short discussion where your peers can give feedback, etc.</a:t>
-            </a:r>
-          </a:p>
-          <a:p>
-            <a:r>
-              <a:rPr lang="en-US" sz="2600" dirty="0"/>
-              <a:t>Today we will </a:t>
-            </a:r>
-            <a:r>
-              <a:rPr lang="en-US" sz="2600"/>
-              <a:t>continue with </a:t>
-            </a:r>
-            <a:r>
-              <a:rPr lang="en-US" sz="2600" dirty="0"/>
-              <a:t>the </a:t>
-            </a:r>
-            <a:r>
-              <a:rPr lang="en-US" sz="2600" b="1" i="1" dirty="0"/>
-              <a:t>history of gaming</a:t>
-            </a:r>
-          </a:p>
-        </p:txBody>
-      </p:sp>
-      <p:sp>
-        <p:nvSpPr>
-          <p:cNvPr id="4" name="Footer Placeholder 3"/>
-          <p:cNvSpPr>
-            <a:spLocks noGrp="1"/>
-          </p:cNvSpPr>
-          <p:nvPr>
-            <p:ph type="ftr" sz="quarter" idx="10"/>
-          </p:nvPr>
-        </p:nvSpPr>
-        <p:spPr/>
-        <p:txBody>
-          <a:bodyPr/>
-          <a:lstStyle/>
-          <a:p>
-            <a:fld id="{D0357299-C40C-42AB-B0C0-2E6E0A5A7F61}" type="slidenum">
-              <a:rPr lang="en-US" altLang="zh-CN" smtClean="0"/>
-              <a:pPr/>
-              <a:t>10</a:t>
-            </a:fld>
-            <a:endParaRPr lang="en-US" altLang="zh-CN"/>
-          </a:p>
-        </p:txBody>
-      </p:sp>
-    </p:spTree>
-    <p:extLst>
-      <p:ext uri="{BB962C8B-B14F-4D97-AF65-F5344CB8AC3E}">
-        <p14:creationId xmlns:p14="http://schemas.microsoft.com/office/powerpoint/2010/main" val="1714522918"/>
-      </p:ext>
-    </p:extLst>
-  </p:cSld>
-  <p:clrMapOvr>
-    <a:masterClrMapping/>
-  </p:clrMapOvr>
-</p:sld>
-</file>
-
-<file path=ppt/slides/slide11.xml><?xml version="1.0" encoding="utf-8"?>
-<p:sld xmlns:a="http://schemas.openxmlformats.org/drawingml/2006/main" xmlns:r="http://schemas.openxmlformats.org/officeDocument/2006/relationships" xmlns:p="http://schemas.openxmlformats.org/presentationml/2006/main">
-  <p:cSld>
-    <p:spTree>
-      <p:nvGrpSpPr>
-        <p:cNvPr id="1" name=""/>
-        <p:cNvGrpSpPr/>
-        <p:nvPr/>
-      </p:nvGrpSpPr>
-      <p:grpSpPr>
-        <a:xfrm>
-          <a:off x="0" y="0"/>
-          <a:ext cx="0" cy="0"/>
-          <a:chOff x="0" y="0"/>
-          <a:chExt cx="0" cy="0"/>
-        </a:xfrm>
-      </p:grpSpPr>
-      <p:sp>
-        <p:nvSpPr>
-          <p:cNvPr id="2" name="Title 1"/>
-          <p:cNvSpPr>
-            <a:spLocks noGrp="1"/>
-          </p:cNvSpPr>
-          <p:nvPr>
-            <p:ph type="title"/>
-          </p:nvPr>
-        </p:nvSpPr>
-        <p:spPr/>
-        <p:txBody>
-          <a:bodyPr/>
-          <a:lstStyle/>
-          <a:p>
-            <a:r>
-              <a:rPr lang="en-US" dirty="0"/>
-              <a:t>Monday, February 24</a:t>
-            </a:r>
-          </a:p>
-        </p:txBody>
-      </p:sp>
-      <p:sp>
-        <p:nvSpPr>
-          <p:cNvPr id="3" name="Content Placeholder 2"/>
-          <p:cNvSpPr>
-            <a:spLocks noGrp="1"/>
-          </p:cNvSpPr>
-          <p:nvPr>
-            <p:ph idx="1"/>
-          </p:nvPr>
-        </p:nvSpPr>
-        <p:spPr/>
-        <p:txBody>
-          <a:bodyPr/>
-          <a:lstStyle/>
-          <a:p>
-            <a:r>
-              <a:rPr lang="en-US" sz="2600" dirty="0"/>
-              <a:t>Due this week:</a:t>
-            </a:r>
-          </a:p>
-          <a:p>
-            <a:pPr lvl="1"/>
-            <a:r>
-              <a:rPr lang="en-US" sz="2200" dirty="0"/>
-              <a:t>Dev Tool</a:t>
-            </a:r>
-          </a:p>
-          <a:p>
-            <a:pPr lvl="1"/>
-            <a:r>
-              <a:rPr lang="en-US" sz="2200" dirty="0"/>
-              <a:t>Area Design I</a:t>
-            </a:r>
-          </a:p>
-          <a:p>
-            <a:r>
-              <a:rPr lang="en-US" sz="2600" dirty="0"/>
-              <a:t>Design teams: Your designs should be quite concrete by now. I’m hearing a lot of teams say “we might do x, we might do y”. You should be WAY past that.</a:t>
-            </a:r>
-          </a:p>
-          <a:p>
-            <a:r>
-              <a:rPr lang="en-US" sz="2600" dirty="0"/>
-              <a:t>Lab this week:</a:t>
-            </a:r>
-          </a:p>
-          <a:p>
-            <a:pPr lvl="1"/>
-            <a:r>
-              <a:rPr lang="en-US" sz="2200" dirty="0"/>
-              <a:t>Presentations again: Please make sure each sub-team presents some kind of update.</a:t>
-            </a:r>
-          </a:p>
-          <a:p>
-            <a:pPr lvl="1"/>
-            <a:r>
-              <a:rPr lang="en-US" sz="2200" dirty="0"/>
-              <a:t>Engine teams: The dev tool is due on Friday. It is a significant step. Everyone feeling ok about it?</a:t>
-            </a:r>
-          </a:p>
-          <a:p>
-            <a:r>
-              <a:rPr lang="en-US" sz="2600" dirty="0"/>
-              <a:t>Today we will finish </a:t>
-            </a:r>
-            <a:r>
-              <a:rPr lang="en-US" sz="2600" b="1" i="1" dirty="0"/>
-              <a:t>history of gaming </a:t>
-            </a:r>
-            <a:r>
-              <a:rPr lang="en-US" sz="2600" dirty="0"/>
-              <a:t>and do </a:t>
-            </a:r>
-            <a:r>
-              <a:rPr lang="en-US" sz="2600" b="1" i="1" dirty="0" err="1"/>
-              <a:t>tweening</a:t>
-            </a:r>
-            <a:endParaRPr lang="en-US" sz="2600" b="1" i="1" dirty="0"/>
-          </a:p>
-        </p:txBody>
-      </p:sp>
-      <p:sp>
-        <p:nvSpPr>
-          <p:cNvPr id="4" name="Footer Placeholder 3"/>
-          <p:cNvSpPr>
-            <a:spLocks noGrp="1"/>
-          </p:cNvSpPr>
-          <p:nvPr>
-            <p:ph type="ftr" sz="quarter" idx="10"/>
-          </p:nvPr>
-        </p:nvSpPr>
-        <p:spPr/>
-        <p:txBody>
-          <a:bodyPr/>
-          <a:lstStyle/>
-          <a:p>
-            <a:fld id="{D0357299-C40C-42AB-B0C0-2E6E0A5A7F61}" type="slidenum">
-              <a:rPr lang="en-US" altLang="zh-CN" smtClean="0"/>
-              <a:pPr/>
-              <a:t>11</a:t>
-            </a:fld>
-            <a:endParaRPr lang="en-US" altLang="zh-CN"/>
-          </a:p>
-        </p:txBody>
-      </p:sp>
-    </p:spTree>
-    <p:extLst>
-      <p:ext uri="{BB962C8B-B14F-4D97-AF65-F5344CB8AC3E}">
-        <p14:creationId xmlns:p14="http://schemas.microsoft.com/office/powerpoint/2010/main" val="4163497550"/>
-      </p:ext>
-    </p:extLst>
-  </p:cSld>
-  <p:clrMapOvr>
-    <a:masterClrMapping/>
-  </p:clrMapOvr>
-</p:sld>
-</file>
-
-<file path=ppt/slides/slide12.xml><?xml version="1.0" encoding="utf-8"?>
-<p:sld xmlns:a="http://schemas.openxmlformats.org/drawingml/2006/main" xmlns:r="http://schemas.openxmlformats.org/officeDocument/2006/relationships" xmlns:p="http://schemas.openxmlformats.org/presentationml/2006/main">
-  <p:cSld>
-    <p:spTree>
-      <p:nvGrpSpPr>
-        <p:cNvPr id="1" name=""/>
-        <p:cNvGrpSpPr/>
-        <p:nvPr/>
-      </p:nvGrpSpPr>
-      <p:grpSpPr>
-        <a:xfrm>
-          <a:off x="0" y="0"/>
-          <a:ext cx="0" cy="0"/>
-          <a:chOff x="0" y="0"/>
-          <a:chExt cx="0" cy="0"/>
-        </a:xfrm>
-      </p:grpSpPr>
-      <p:sp>
-        <p:nvSpPr>
-          <p:cNvPr id="2" name="Title 1"/>
-          <p:cNvSpPr>
-            <a:spLocks noGrp="1"/>
-          </p:cNvSpPr>
-          <p:nvPr>
-            <p:ph type="title"/>
-          </p:nvPr>
-        </p:nvSpPr>
-        <p:spPr/>
-        <p:txBody>
-          <a:bodyPr/>
-          <a:lstStyle/>
-          <a:p>
-            <a:r>
-              <a:rPr lang="en-US" dirty="0"/>
-              <a:t>Monday, March 2</a:t>
-            </a:r>
-          </a:p>
-        </p:txBody>
-      </p:sp>
-      <p:sp>
-        <p:nvSpPr>
-          <p:cNvPr id="3" name="Content Placeholder 2"/>
-          <p:cNvSpPr>
-            <a:spLocks noGrp="1"/>
-          </p:cNvSpPr>
-          <p:nvPr>
-            <p:ph idx="1"/>
-          </p:nvPr>
-        </p:nvSpPr>
-        <p:spPr/>
-        <p:txBody>
-          <a:bodyPr/>
-          <a:lstStyle/>
-          <a:p>
-            <a:r>
-              <a:rPr lang="en-US" sz="2600" dirty="0"/>
-              <a:t>Due this week:</a:t>
-            </a:r>
-          </a:p>
-          <a:p>
-            <a:pPr lvl="1"/>
-            <a:r>
-              <a:rPr lang="en-US" sz="2200" dirty="0"/>
-              <a:t>Engine: </a:t>
-            </a:r>
-            <a:r>
-              <a:rPr lang="en-US" sz="2200" dirty="0" err="1"/>
-              <a:t>Spritesheet</a:t>
-            </a:r>
-            <a:r>
-              <a:rPr lang="en-US" sz="2200" dirty="0"/>
-              <a:t> and controller support</a:t>
-            </a:r>
-          </a:p>
-          <a:p>
-            <a:pPr lvl="1"/>
-            <a:r>
-              <a:rPr lang="en-US" sz="2200" dirty="0"/>
-              <a:t>Level: Parallax and </a:t>
-            </a:r>
-            <a:r>
-              <a:rPr lang="en-US" sz="2200" dirty="0" err="1"/>
-              <a:t>Tweening</a:t>
-            </a:r>
-            <a:endParaRPr lang="en-US" sz="2200" dirty="0"/>
-          </a:p>
-          <a:p>
-            <a:r>
-              <a:rPr lang="en-US" sz="2600" dirty="0"/>
-              <a:t>Engine teams – I know the dev tool was a big project.</a:t>
-            </a:r>
-          </a:p>
-          <a:p>
-            <a:r>
-              <a:rPr lang="en-US" sz="2600" dirty="0"/>
-              <a:t>Major grading update: You may now get regrades from a 0 as well as from a 1.</a:t>
-            </a:r>
-          </a:p>
-          <a:p>
-            <a:pPr lvl="1"/>
-            <a:r>
-              <a:rPr lang="en-US" sz="2200" dirty="0"/>
-              <a:t>However, there will be team </a:t>
-            </a:r>
-            <a:r>
-              <a:rPr lang="en-US" sz="2200" dirty="0" err="1"/>
-              <a:t>evals</a:t>
-            </a:r>
-            <a:r>
-              <a:rPr lang="en-US" sz="2200" dirty="0"/>
-              <a:t> soon that could affect your grade if you aren’t getting your work done.</a:t>
-            </a:r>
-          </a:p>
-          <a:p>
-            <a:r>
-              <a:rPr lang="en-US" sz="2600" dirty="0"/>
-              <a:t>How has the lab loop been? Presentations + working? </a:t>
-            </a:r>
-          </a:p>
-          <a:p>
-            <a:pPr lvl="1"/>
-            <a:r>
-              <a:rPr lang="en-US" sz="2200" dirty="0"/>
-              <a:t>Working ok? Are the presentation fun and hopefully useful?</a:t>
-            </a:r>
-          </a:p>
-          <a:p>
-            <a:r>
-              <a:rPr lang="en-US" sz="2600" dirty="0"/>
-              <a:t>Today we will finish </a:t>
-            </a:r>
-            <a:r>
-              <a:rPr lang="en-US" sz="2600" b="1" i="1" dirty="0"/>
-              <a:t>MDA </a:t>
-            </a:r>
-            <a:r>
-              <a:rPr lang="en-US" sz="2600" dirty="0"/>
-              <a:t>and </a:t>
-            </a:r>
-            <a:r>
-              <a:rPr lang="en-US" sz="2600"/>
-              <a:t>start </a:t>
-            </a:r>
-            <a:r>
-              <a:rPr lang="en-US" sz="2600" b="1" i="1"/>
-              <a:t>Level Design!</a:t>
-            </a:r>
-            <a:endParaRPr lang="en-US" sz="2600" b="1" i="1" dirty="0"/>
-          </a:p>
-        </p:txBody>
-      </p:sp>
-      <p:sp>
-        <p:nvSpPr>
-          <p:cNvPr id="4" name="Footer Placeholder 3"/>
-          <p:cNvSpPr>
-            <a:spLocks noGrp="1"/>
-          </p:cNvSpPr>
-          <p:nvPr>
-            <p:ph type="ftr" sz="quarter" idx="10"/>
-          </p:nvPr>
-        </p:nvSpPr>
-        <p:spPr/>
-        <p:txBody>
-          <a:bodyPr/>
-          <a:lstStyle/>
-          <a:p>
-            <a:fld id="{D0357299-C40C-42AB-B0C0-2E6E0A5A7F61}" type="slidenum">
-              <a:rPr lang="en-US" altLang="zh-CN" smtClean="0"/>
-              <a:pPr/>
-              <a:t>12</a:t>
-            </a:fld>
-            <a:endParaRPr lang="en-US" altLang="zh-CN"/>
-          </a:p>
-        </p:txBody>
-      </p:sp>
-    </p:spTree>
-    <p:extLst>
-      <p:ext uri="{BB962C8B-B14F-4D97-AF65-F5344CB8AC3E}">
-        <p14:creationId xmlns:p14="http://schemas.microsoft.com/office/powerpoint/2010/main" val="2688848194"/>
-      </p:ext>
-    </p:extLst>
-  </p:cSld>
-  <p:clrMapOvr>
-    <a:masterClrMapping/>
-  </p:clrMapOvr>
-</p:sld>
-</file>
-
 <file path=ppt/slides/slide2.xml><?xml version="1.0" encoding="utf-8"?>
 <p:sld xmlns:a="http://schemas.openxmlformats.org/drawingml/2006/main" xmlns:r="http://schemas.openxmlformats.org/officeDocument/2006/relationships" xmlns:p="http://schemas.openxmlformats.org/presentationml/2006/main">
   <p:cSld>
@@ -4562,7 +4030,7 @@
           <a:p>
             <a:r>
               <a:rPr lang="en-US" dirty="0"/>
-              <a:t>Wednesday, January 15</a:t>
+              <a:t>Thursday, August 27</a:t>
             </a:r>
           </a:p>
         </p:txBody>
@@ -4584,87 +4052,9 @@
           <a:p>
             <a:r>
               <a:rPr lang="en-US" sz="2600" dirty="0"/>
-              <a:t>There is now a </a:t>
-            </a:r>
-            <a:r>
-              <a:rPr lang="en-US" sz="2600" b="1" i="1" dirty="0"/>
-              <a:t>calendar</a:t>
-            </a:r>
-            <a:r>
-              <a:rPr lang="en-US" sz="2600" dirty="0"/>
-              <a:t> linked on the course webpage. Shows OH for </a:t>
-            </a:r>
-            <a:r>
-              <a:rPr lang="en-US" sz="2600" dirty="0" err="1"/>
-              <a:t>Floryan</a:t>
-            </a:r>
-            <a:r>
-              <a:rPr lang="en-US" sz="2600" dirty="0"/>
-              <a:t> and </a:t>
-            </a:r>
-            <a:r>
-              <a:rPr lang="en-US" sz="2600" dirty="0" err="1"/>
-              <a:t>Tas</a:t>
-            </a:r>
-            <a:endParaRPr lang="en-US" sz="2600" dirty="0"/>
-          </a:p>
-          <a:p>
-            <a:r>
-              <a:rPr lang="en-US" sz="2600" dirty="0"/>
-              <a:t>All </a:t>
-            </a:r>
-            <a:r>
-              <a:rPr lang="en-US" sz="2600" b="1" i="1" dirty="0"/>
-              <a:t>assignments</a:t>
-            </a:r>
-            <a:r>
-              <a:rPr lang="en-US" sz="2600" dirty="0"/>
-              <a:t> are up on Collab and are open now</a:t>
-            </a:r>
-          </a:p>
-          <a:p>
-            <a:pPr lvl="1"/>
-            <a:r>
-              <a:rPr lang="en-US" sz="2200" dirty="0"/>
-              <a:t>in case folks end up deciding to do any early.</a:t>
-            </a:r>
-          </a:p>
-          <a:p>
-            <a:pPr lvl="1"/>
-            <a:r>
-              <a:rPr lang="en-US" sz="2200" dirty="0"/>
-              <a:t>assignments all due on Friday of the given week @ 6pm</a:t>
-            </a:r>
-          </a:p>
-          <a:p>
-            <a:r>
-              <a:rPr lang="en-US" sz="2600" dirty="0"/>
-              <a:t>Enrollment: 13 people added to early lab were already notified. If spaces start to open up, I’ll keep notifying people.</a:t>
-            </a:r>
-          </a:p>
-          <a:p>
-            <a:r>
-              <a:rPr lang="en-US" sz="2600" b="1" i="1" dirty="0"/>
-              <a:t>Lab this week</a:t>
-            </a:r>
-            <a:r>
-              <a:rPr lang="en-US" sz="2600" dirty="0"/>
-              <a:t>, come prepared to:</a:t>
-            </a:r>
-          </a:p>
-          <a:p>
-            <a:pPr lvl="1"/>
-            <a:r>
-              <a:rPr lang="en-US" sz="2200" dirty="0"/>
-              <a:t>Give a 2-3 minute pitch for your game idea. </a:t>
-            </a:r>
-          </a:p>
-          <a:p>
-            <a:pPr lvl="1"/>
-            <a:r>
-              <a:rPr lang="en-US" sz="2200" dirty="0"/>
-              <a:t>We will vote on projects we are interested in and get into groups</a:t>
-            </a:r>
+              <a:t>…Announcements will go here.</a:t>
+            </a:r>
+            <a:endParaRPr lang="en-US" sz="2200" dirty="0"/>
           </a:p>
         </p:txBody>
       </p:sp>
@@ -4696,1194 +4086,6 @@
     <p:extLst>
       <p:ext uri="{BB962C8B-B14F-4D97-AF65-F5344CB8AC3E}">
         <p14:creationId xmlns:p14="http://schemas.microsoft.com/office/powerpoint/2010/main" val="3418064323"/>
-      </p:ext>
-    </p:extLst>
-  </p:cSld>
-  <p:clrMapOvr>
-    <a:masterClrMapping/>
-  </p:clrMapOvr>
-</p:sld>
-</file>
-
-<file path=ppt/slides/slide3.xml><?xml version="1.0" encoding="utf-8"?>
-<p:sld xmlns:a="http://schemas.openxmlformats.org/drawingml/2006/main" xmlns:r="http://schemas.openxmlformats.org/officeDocument/2006/relationships" xmlns:p="http://schemas.openxmlformats.org/presentationml/2006/main">
-  <p:cSld>
-    <p:spTree>
-      <p:nvGrpSpPr>
-        <p:cNvPr id="1" name=""/>
-        <p:cNvGrpSpPr/>
-        <p:nvPr/>
-      </p:nvGrpSpPr>
-      <p:grpSpPr>
-        <a:xfrm>
-          <a:off x="0" y="0"/>
-          <a:ext cx="0" cy="0"/>
-          <a:chOff x="0" y="0"/>
-          <a:chExt cx="0" cy="0"/>
-        </a:xfrm>
-      </p:grpSpPr>
-      <p:sp>
-        <p:nvSpPr>
-          <p:cNvPr id="2" name="Title 1"/>
-          <p:cNvSpPr>
-            <a:spLocks noGrp="1"/>
-          </p:cNvSpPr>
-          <p:nvPr>
-            <p:ph type="title"/>
-          </p:nvPr>
-        </p:nvSpPr>
-        <p:spPr/>
-        <p:txBody>
-          <a:bodyPr/>
-          <a:lstStyle/>
-          <a:p>
-            <a:r>
-              <a:rPr lang="en-US" dirty="0"/>
-              <a:t>Wednesday, January 22</a:t>
-            </a:r>
-          </a:p>
-        </p:txBody>
-      </p:sp>
-      <p:sp>
-        <p:nvSpPr>
-          <p:cNvPr id="3" name="Content Placeholder 2"/>
-          <p:cNvSpPr>
-            <a:spLocks noGrp="1"/>
-          </p:cNvSpPr>
-          <p:nvPr>
-            <p:ph idx="1"/>
-          </p:nvPr>
-        </p:nvSpPr>
-        <p:spPr/>
-        <p:txBody>
-          <a:bodyPr/>
-          <a:lstStyle/>
-          <a:p>
-            <a:r>
-              <a:rPr lang="en-US" sz="2600" dirty="0"/>
-              <a:t>First </a:t>
-            </a:r>
-            <a:r>
-              <a:rPr lang="en-US" sz="2600" b="1" i="1" dirty="0"/>
-              <a:t>assignments</a:t>
-            </a:r>
-            <a:r>
-              <a:rPr lang="en-US" sz="2600" dirty="0"/>
-              <a:t> is due this Friday</a:t>
-            </a:r>
-          </a:p>
-          <a:p>
-            <a:pPr lvl="1"/>
-            <a:r>
-              <a:rPr lang="en-US" sz="2200" dirty="0"/>
-              <a:t>Installing SDL2 can be a pain, please start early</a:t>
-            </a:r>
-          </a:p>
-          <a:p>
-            <a:pPr lvl="1"/>
-            <a:r>
-              <a:rPr lang="en-US" sz="2200" dirty="0"/>
-              <a:t>Update for windows users</a:t>
-            </a:r>
-          </a:p>
-          <a:p>
-            <a:pPr lvl="2"/>
-            <a:r>
-              <a:rPr lang="en-US" sz="1800" dirty="0"/>
-              <a:t>The intention was for everyone to use </a:t>
-            </a:r>
-            <a:r>
-              <a:rPr lang="en-US" sz="1800" dirty="0" err="1"/>
-              <a:t>unix</a:t>
-            </a:r>
-            <a:r>
-              <a:rPr lang="en-US" sz="1800" dirty="0"/>
-              <a:t>.</a:t>
-            </a:r>
-          </a:p>
-          <a:p>
-            <a:r>
-              <a:rPr lang="en-US" sz="2600" b="1" i="1" dirty="0"/>
-              <a:t>Groups</a:t>
-            </a:r>
-            <a:r>
-              <a:rPr lang="en-US" sz="2600" dirty="0"/>
-              <a:t>: If you don’t have a group, we need to figure that out by end of lab this week. Contact your TA in lab.</a:t>
-            </a:r>
-          </a:p>
-          <a:p>
-            <a:r>
-              <a:rPr lang="en-US" sz="2600" b="1" i="1" dirty="0"/>
-              <a:t>Lab this week</a:t>
-            </a:r>
-            <a:r>
-              <a:rPr lang="en-US" sz="2600" dirty="0"/>
-              <a:t>, come prepared to:</a:t>
-            </a:r>
-          </a:p>
-          <a:p>
-            <a:pPr lvl="1"/>
-            <a:r>
-              <a:rPr lang="en-US" sz="2200" dirty="0"/>
-              <a:t>Polish any issues with the groups</a:t>
-            </a:r>
-          </a:p>
-          <a:p>
-            <a:pPr lvl="1"/>
-            <a:r>
-              <a:rPr lang="en-US" sz="2200" dirty="0"/>
-              <a:t>Work on first homework</a:t>
-            </a:r>
-          </a:p>
-          <a:p>
-            <a:pPr lvl="1"/>
-            <a:r>
-              <a:rPr lang="en-US" sz="2200" dirty="0"/>
-              <a:t>You can leave once you show TA working solution</a:t>
-            </a:r>
-          </a:p>
-          <a:p>
-            <a:r>
-              <a:rPr lang="en-US" sz="2600" dirty="0"/>
-              <a:t>Today we will finish sprites, affine transforms, etc.</a:t>
-            </a:r>
-          </a:p>
-        </p:txBody>
-      </p:sp>
-      <p:sp>
-        <p:nvSpPr>
-          <p:cNvPr id="4" name="Footer Placeholder 3"/>
-          <p:cNvSpPr>
-            <a:spLocks noGrp="1"/>
-          </p:cNvSpPr>
-          <p:nvPr>
-            <p:ph type="ftr" sz="quarter" idx="10"/>
-          </p:nvPr>
-        </p:nvSpPr>
-        <p:spPr/>
-        <p:txBody>
-          <a:bodyPr/>
-          <a:lstStyle/>
-          <a:p>
-            <a:fld id="{D0357299-C40C-42AB-B0C0-2E6E0A5A7F61}" type="slidenum">
-              <a:rPr lang="en-US" altLang="zh-CN" smtClean="0"/>
-              <a:pPr/>
-              <a:t>3</a:t>
-            </a:fld>
-            <a:endParaRPr lang="en-US" altLang="zh-CN"/>
-          </a:p>
-        </p:txBody>
-      </p:sp>
-    </p:spTree>
-    <p:extLst>
-      <p:ext uri="{BB962C8B-B14F-4D97-AF65-F5344CB8AC3E}">
-        <p14:creationId xmlns:p14="http://schemas.microsoft.com/office/powerpoint/2010/main" val="2480205876"/>
-      </p:ext>
-    </p:extLst>
-  </p:cSld>
-  <p:clrMapOvr>
-    <a:masterClrMapping/>
-  </p:clrMapOvr>
-</p:sld>
-</file>
-
-<file path=ppt/slides/slide4.xml><?xml version="1.0" encoding="utf-8"?>
-<p:sld xmlns:a="http://schemas.openxmlformats.org/drawingml/2006/main" xmlns:r="http://schemas.openxmlformats.org/officeDocument/2006/relationships" xmlns:p="http://schemas.openxmlformats.org/presentationml/2006/main">
-  <p:cSld>
-    <p:spTree>
-      <p:nvGrpSpPr>
-        <p:cNvPr id="1" name=""/>
-        <p:cNvGrpSpPr/>
-        <p:nvPr/>
-      </p:nvGrpSpPr>
-      <p:grpSpPr>
-        <a:xfrm>
-          <a:off x="0" y="0"/>
-          <a:ext cx="0" cy="0"/>
-          <a:chOff x="0" y="0"/>
-          <a:chExt cx="0" cy="0"/>
-        </a:xfrm>
-      </p:grpSpPr>
-      <p:sp>
-        <p:nvSpPr>
-          <p:cNvPr id="2" name="Title 1"/>
-          <p:cNvSpPr>
-            <a:spLocks noGrp="1"/>
-          </p:cNvSpPr>
-          <p:nvPr>
-            <p:ph type="title"/>
-          </p:nvPr>
-        </p:nvSpPr>
-        <p:spPr/>
-        <p:txBody>
-          <a:bodyPr/>
-          <a:lstStyle/>
-          <a:p>
-            <a:r>
-              <a:rPr lang="en-US" dirty="0"/>
-              <a:t>Monday, January 27</a:t>
-            </a:r>
-          </a:p>
-        </p:txBody>
-      </p:sp>
-      <p:sp>
-        <p:nvSpPr>
-          <p:cNvPr id="3" name="Content Placeholder 2"/>
-          <p:cNvSpPr>
-            <a:spLocks noGrp="1"/>
-          </p:cNvSpPr>
-          <p:nvPr>
-            <p:ph idx="1"/>
-          </p:nvPr>
-        </p:nvSpPr>
-        <p:spPr/>
-        <p:txBody>
-          <a:bodyPr/>
-          <a:lstStyle/>
-          <a:p>
-            <a:r>
-              <a:rPr lang="en-US" sz="2600" dirty="0"/>
-              <a:t>First </a:t>
-            </a:r>
-            <a:r>
-              <a:rPr lang="en-US" sz="2600" b="1" i="1" dirty="0"/>
-              <a:t>assignment</a:t>
-            </a:r>
-            <a:r>
-              <a:rPr lang="en-US" sz="2600" dirty="0"/>
-              <a:t> is due Tuesday</a:t>
-            </a:r>
-          </a:p>
-          <a:p>
-            <a:pPr lvl="1"/>
-            <a:r>
-              <a:rPr lang="en-US" sz="2200" dirty="0"/>
-              <a:t>Does anyone still not have SDL2 running?</a:t>
-            </a:r>
-          </a:p>
-          <a:p>
-            <a:r>
-              <a:rPr lang="en-US" sz="2600" b="1" i="1" dirty="0"/>
-              <a:t>Groups</a:t>
-            </a:r>
-            <a:r>
-              <a:rPr lang="en-US" sz="2600" dirty="0"/>
-              <a:t>: Anybody not have one?</a:t>
-            </a:r>
-          </a:p>
-          <a:p>
-            <a:r>
-              <a:rPr lang="en-US" sz="2600" b="1" i="1" dirty="0"/>
-              <a:t>HW2</a:t>
-            </a:r>
-            <a:r>
-              <a:rPr lang="en-US" sz="2600" dirty="0"/>
-              <a:t> is due this Friday (will go over it today)</a:t>
-            </a:r>
-          </a:p>
-          <a:p>
-            <a:r>
-              <a:rPr lang="en-US" sz="2600" b="1" i="1" dirty="0"/>
-              <a:t>Lab this week</a:t>
-            </a:r>
-            <a:r>
-              <a:rPr lang="en-US" sz="2600" dirty="0"/>
-              <a:t>, come prepared to:</a:t>
-            </a:r>
-          </a:p>
-          <a:p>
-            <a:pPr lvl="1"/>
-            <a:r>
-              <a:rPr lang="en-US" sz="2200" dirty="0"/>
-              <a:t>Lab this week is just working on homework and getting everyone up to speed.</a:t>
-            </a:r>
-          </a:p>
-          <a:p>
-            <a:pPr lvl="1"/>
-            <a:r>
-              <a:rPr lang="en-US" sz="2200" dirty="0"/>
-              <a:t>Next week will be our first big push on the projects</a:t>
-            </a:r>
-          </a:p>
-          <a:p>
-            <a:r>
-              <a:rPr lang="en-US" sz="2600" dirty="0"/>
-              <a:t>Today we will finish sprites quickly and do display trees.</a:t>
-            </a:r>
-          </a:p>
-        </p:txBody>
-      </p:sp>
-      <p:sp>
-        <p:nvSpPr>
-          <p:cNvPr id="4" name="Footer Placeholder 3"/>
-          <p:cNvSpPr>
-            <a:spLocks noGrp="1"/>
-          </p:cNvSpPr>
-          <p:nvPr>
-            <p:ph type="ftr" sz="quarter" idx="10"/>
-          </p:nvPr>
-        </p:nvSpPr>
-        <p:spPr/>
-        <p:txBody>
-          <a:bodyPr/>
-          <a:lstStyle/>
-          <a:p>
-            <a:fld id="{D0357299-C40C-42AB-B0C0-2E6E0A5A7F61}" type="slidenum">
-              <a:rPr lang="en-US" altLang="zh-CN" smtClean="0"/>
-              <a:pPr/>
-              <a:t>4</a:t>
-            </a:fld>
-            <a:endParaRPr lang="en-US" altLang="zh-CN"/>
-          </a:p>
-        </p:txBody>
-      </p:sp>
-    </p:spTree>
-    <p:extLst>
-      <p:ext uri="{BB962C8B-B14F-4D97-AF65-F5344CB8AC3E}">
-        <p14:creationId xmlns:p14="http://schemas.microsoft.com/office/powerpoint/2010/main" val="1667634209"/>
-      </p:ext>
-    </p:extLst>
-  </p:cSld>
-  <p:clrMapOvr>
-    <a:masterClrMapping/>
-  </p:clrMapOvr>
-</p:sld>
-</file>
-
-<file path=ppt/slides/slide5.xml><?xml version="1.0" encoding="utf-8"?>
-<p:sld xmlns:a="http://schemas.openxmlformats.org/drawingml/2006/main" xmlns:r="http://schemas.openxmlformats.org/officeDocument/2006/relationships" xmlns:p="http://schemas.openxmlformats.org/presentationml/2006/main">
-  <p:cSld>
-    <p:spTree>
-      <p:nvGrpSpPr>
-        <p:cNvPr id="1" name=""/>
-        <p:cNvGrpSpPr/>
-        <p:nvPr/>
-      </p:nvGrpSpPr>
-      <p:grpSpPr>
-        <a:xfrm>
-          <a:off x="0" y="0"/>
-          <a:ext cx="0" cy="0"/>
-          <a:chOff x="0" y="0"/>
-          <a:chExt cx="0" cy="0"/>
-        </a:xfrm>
-      </p:grpSpPr>
-      <p:sp>
-        <p:nvSpPr>
-          <p:cNvPr id="2" name="Title 1"/>
-          <p:cNvSpPr>
-            <a:spLocks noGrp="1"/>
-          </p:cNvSpPr>
-          <p:nvPr>
-            <p:ph type="title"/>
-          </p:nvPr>
-        </p:nvSpPr>
-        <p:spPr/>
-        <p:txBody>
-          <a:bodyPr/>
-          <a:lstStyle/>
-          <a:p>
-            <a:r>
-              <a:rPr lang="en-US" dirty="0"/>
-              <a:t>Wednesday, January 29</a:t>
-            </a:r>
-          </a:p>
-        </p:txBody>
-      </p:sp>
-      <p:sp>
-        <p:nvSpPr>
-          <p:cNvPr id="3" name="Content Placeholder 2"/>
-          <p:cNvSpPr>
-            <a:spLocks noGrp="1"/>
-          </p:cNvSpPr>
-          <p:nvPr>
-            <p:ph idx="1"/>
-          </p:nvPr>
-        </p:nvSpPr>
-        <p:spPr/>
-        <p:txBody>
-          <a:bodyPr/>
-          <a:lstStyle/>
-          <a:p>
-            <a:r>
-              <a:rPr lang="en-US" sz="2600" dirty="0"/>
-              <a:t>First </a:t>
-            </a:r>
-            <a:r>
-              <a:rPr lang="en-US" sz="2600" b="1" i="1" dirty="0"/>
-              <a:t>assignment</a:t>
-            </a:r>
-            <a:r>
-              <a:rPr lang="en-US" sz="2600" dirty="0"/>
-              <a:t> was due yesterday.</a:t>
-            </a:r>
-          </a:p>
-          <a:p>
-            <a:pPr lvl="1"/>
-            <a:r>
-              <a:rPr lang="en-US" sz="2200" dirty="0"/>
-              <a:t>Everything go ok?</a:t>
-            </a:r>
-          </a:p>
-          <a:p>
-            <a:r>
-              <a:rPr lang="en-US" sz="2600" b="1" i="1" dirty="0"/>
-              <a:t>Groups</a:t>
-            </a:r>
-            <a:r>
-              <a:rPr lang="en-US" sz="2600" dirty="0"/>
-              <a:t>: Anybody not have one?</a:t>
-            </a:r>
-          </a:p>
-          <a:p>
-            <a:r>
-              <a:rPr lang="en-US" sz="2600" b="1" i="1" dirty="0"/>
-              <a:t>HW2</a:t>
-            </a:r>
-            <a:r>
-              <a:rPr lang="en-US" sz="2600" dirty="0"/>
-              <a:t> is due this Friday. Display Trees!</a:t>
-            </a:r>
-          </a:p>
-          <a:p>
-            <a:r>
-              <a:rPr lang="en-US" sz="2600" b="1" i="1" dirty="0"/>
-              <a:t>Lab this week</a:t>
-            </a:r>
-            <a:r>
-              <a:rPr lang="en-US" sz="2600" dirty="0"/>
-              <a:t>, come prepared to:</a:t>
-            </a:r>
-          </a:p>
-          <a:p>
-            <a:pPr lvl="1"/>
-            <a:r>
-              <a:rPr lang="en-US" sz="2200" dirty="0"/>
-              <a:t>Last chance for groups. Let us know if there have been drops.</a:t>
-            </a:r>
-          </a:p>
-          <a:p>
-            <a:pPr lvl="1"/>
-            <a:r>
-              <a:rPr lang="en-US" sz="2200" dirty="0"/>
-              <a:t>Lab this week is just working on homework etc.</a:t>
-            </a:r>
-          </a:p>
-          <a:p>
-            <a:pPr lvl="1"/>
-            <a:r>
-              <a:rPr lang="en-US" sz="2200" dirty="0"/>
-              <a:t>Next week will be our first big push on the projects</a:t>
-            </a:r>
-          </a:p>
-          <a:p>
-            <a:r>
-              <a:rPr lang="en-US" sz="2600"/>
-              <a:t>Poison!!</a:t>
-            </a:r>
-            <a:endParaRPr lang="en-US" sz="2600" dirty="0"/>
-          </a:p>
-          <a:p>
-            <a:r>
-              <a:rPr lang="en-US" sz="2600" dirty="0"/>
-              <a:t>Today we will a very quick lecture on observer design pattern and start our first game design side lecture.</a:t>
-            </a:r>
-          </a:p>
-        </p:txBody>
-      </p:sp>
-      <p:sp>
-        <p:nvSpPr>
-          <p:cNvPr id="4" name="Footer Placeholder 3"/>
-          <p:cNvSpPr>
-            <a:spLocks noGrp="1"/>
-          </p:cNvSpPr>
-          <p:nvPr>
-            <p:ph type="ftr" sz="quarter" idx="10"/>
-          </p:nvPr>
-        </p:nvSpPr>
-        <p:spPr/>
-        <p:txBody>
-          <a:bodyPr/>
-          <a:lstStyle/>
-          <a:p>
-            <a:fld id="{D0357299-C40C-42AB-B0C0-2E6E0A5A7F61}" type="slidenum">
-              <a:rPr lang="en-US" altLang="zh-CN" smtClean="0"/>
-              <a:pPr/>
-              <a:t>5</a:t>
-            </a:fld>
-            <a:endParaRPr lang="en-US" altLang="zh-CN"/>
-          </a:p>
-        </p:txBody>
-      </p:sp>
-    </p:spTree>
-    <p:extLst>
-      <p:ext uri="{BB962C8B-B14F-4D97-AF65-F5344CB8AC3E}">
-        <p14:creationId xmlns:p14="http://schemas.microsoft.com/office/powerpoint/2010/main" val="2542556573"/>
-      </p:ext>
-    </p:extLst>
-  </p:cSld>
-  <p:clrMapOvr>
-    <a:masterClrMapping/>
-  </p:clrMapOvr>
-</p:sld>
-</file>
-
-<file path=ppt/slides/slide6.xml><?xml version="1.0" encoding="utf-8"?>
-<p:sld xmlns:a="http://schemas.openxmlformats.org/drawingml/2006/main" xmlns:r="http://schemas.openxmlformats.org/officeDocument/2006/relationships" xmlns:p="http://schemas.openxmlformats.org/presentationml/2006/main">
-  <p:cSld>
-    <p:spTree>
-      <p:nvGrpSpPr>
-        <p:cNvPr id="1" name=""/>
-        <p:cNvGrpSpPr/>
-        <p:nvPr/>
-      </p:nvGrpSpPr>
-      <p:grpSpPr>
-        <a:xfrm>
-          <a:off x="0" y="0"/>
-          <a:ext cx="0" cy="0"/>
-          <a:chOff x="0" y="0"/>
-          <a:chExt cx="0" cy="0"/>
-        </a:xfrm>
-      </p:grpSpPr>
-      <p:sp>
-        <p:nvSpPr>
-          <p:cNvPr id="2" name="Title 1"/>
-          <p:cNvSpPr>
-            <a:spLocks noGrp="1"/>
-          </p:cNvSpPr>
-          <p:nvPr>
-            <p:ph type="title"/>
-          </p:nvPr>
-        </p:nvSpPr>
-        <p:spPr/>
-        <p:txBody>
-          <a:bodyPr/>
-          <a:lstStyle/>
-          <a:p>
-            <a:r>
-              <a:rPr lang="en-US" dirty="0"/>
-              <a:t>Monday, February 3</a:t>
-            </a:r>
-          </a:p>
-        </p:txBody>
-      </p:sp>
-      <p:sp>
-        <p:nvSpPr>
-          <p:cNvPr id="3" name="Content Placeholder 2"/>
-          <p:cNvSpPr>
-            <a:spLocks noGrp="1"/>
-          </p:cNvSpPr>
-          <p:nvPr>
-            <p:ph idx="1"/>
-          </p:nvPr>
-        </p:nvSpPr>
-        <p:spPr/>
-        <p:txBody>
-          <a:bodyPr/>
-          <a:lstStyle/>
-          <a:p>
-            <a:r>
-              <a:rPr lang="en-US" sz="2600" b="1" i="1" dirty="0" err="1"/>
-              <a:t>Floryanator</a:t>
-            </a:r>
-            <a:r>
-              <a:rPr lang="en-US" sz="2600" dirty="0"/>
-              <a:t> is concerned</a:t>
-            </a:r>
-          </a:p>
-          <a:p>
-            <a:pPr lvl="1"/>
-            <a:r>
-              <a:rPr lang="en-US" sz="1800" dirty="0"/>
-              <a:t>HW 1 was graded, and the grades were….not good. </a:t>
-            </a:r>
-          </a:p>
-          <a:p>
-            <a:pPr lvl="1"/>
-            <a:r>
-              <a:rPr lang="en-US" sz="1800" dirty="0"/>
-              <a:t>Initial thought: Take one more week to get hw1 and 2 perfect. Push all else back</a:t>
-            </a:r>
-            <a:endParaRPr lang="en-US" sz="2200" dirty="0"/>
-          </a:p>
-          <a:p>
-            <a:r>
-              <a:rPr lang="en-US" sz="2600" b="1" i="1" dirty="0"/>
-              <a:t>Homework this week </a:t>
-            </a:r>
-            <a:r>
-              <a:rPr lang="en-US" sz="2600" dirty="0"/>
-              <a:t>is dependent on discussion above</a:t>
-            </a:r>
-          </a:p>
-          <a:p>
-            <a:r>
-              <a:rPr lang="en-US" sz="2600" b="1" i="1" dirty="0"/>
-              <a:t>Lecture today:</a:t>
-            </a:r>
-          </a:p>
-          <a:p>
-            <a:pPr lvl="1"/>
-            <a:r>
-              <a:rPr lang="en-US" sz="1800" dirty="0"/>
-              <a:t>We can spend some time going over </a:t>
-            </a:r>
-            <a:r>
-              <a:rPr lang="en-US" sz="1800" dirty="0" err="1"/>
-              <a:t>AffineTransform</a:t>
-            </a:r>
-            <a:r>
-              <a:rPr lang="en-US" sz="1800" dirty="0"/>
-              <a:t> again, how to implement and piece everything together in more detail today if you want.</a:t>
-            </a:r>
-          </a:p>
-          <a:p>
-            <a:r>
-              <a:rPr lang="en-US" sz="2600" dirty="0"/>
-              <a:t>Going to skip poison today, too much else to discuss.</a:t>
-            </a:r>
-          </a:p>
-          <a:p>
-            <a:r>
-              <a:rPr lang="en-US" sz="2600" dirty="0"/>
-              <a:t>Policy change going forward:</a:t>
-            </a:r>
-          </a:p>
-          <a:p>
-            <a:pPr lvl="1"/>
-            <a:r>
-              <a:rPr lang="en-US" sz="2200" dirty="0"/>
-              <a:t>For group project, 2/2 is considered passing. If you don’t earn at least a 1 on initial submission, then you can’t resubmit to raise the grade. This will help ensure everyone puts effort in by intended deadline.</a:t>
-            </a:r>
-          </a:p>
-        </p:txBody>
-      </p:sp>
-      <p:sp>
-        <p:nvSpPr>
-          <p:cNvPr id="4" name="Footer Placeholder 3"/>
-          <p:cNvSpPr>
-            <a:spLocks noGrp="1"/>
-          </p:cNvSpPr>
-          <p:nvPr>
-            <p:ph type="ftr" sz="quarter" idx="10"/>
-          </p:nvPr>
-        </p:nvSpPr>
-        <p:spPr/>
-        <p:txBody>
-          <a:bodyPr/>
-          <a:lstStyle/>
-          <a:p>
-            <a:fld id="{D0357299-C40C-42AB-B0C0-2E6E0A5A7F61}" type="slidenum">
-              <a:rPr lang="en-US" altLang="zh-CN" smtClean="0"/>
-              <a:pPr/>
-              <a:t>6</a:t>
-            </a:fld>
-            <a:endParaRPr lang="en-US" altLang="zh-CN"/>
-          </a:p>
-        </p:txBody>
-      </p:sp>
-    </p:spTree>
-    <p:extLst>
-      <p:ext uri="{BB962C8B-B14F-4D97-AF65-F5344CB8AC3E}">
-        <p14:creationId xmlns:p14="http://schemas.microsoft.com/office/powerpoint/2010/main" val="3286361728"/>
-      </p:ext>
-    </p:extLst>
-  </p:cSld>
-  <p:clrMapOvr>
-    <a:masterClrMapping/>
-  </p:clrMapOvr>
-</p:sld>
-</file>
-
-<file path=ppt/slides/slide7.xml><?xml version="1.0" encoding="utf-8"?>
-<p:sld xmlns:a="http://schemas.openxmlformats.org/drawingml/2006/main" xmlns:r="http://schemas.openxmlformats.org/officeDocument/2006/relationships" xmlns:p="http://schemas.openxmlformats.org/presentationml/2006/main">
-  <p:cSld>
-    <p:spTree>
-      <p:nvGrpSpPr>
-        <p:cNvPr id="1" name=""/>
-        <p:cNvGrpSpPr/>
-        <p:nvPr/>
-      </p:nvGrpSpPr>
-      <p:grpSpPr>
-        <a:xfrm>
-          <a:off x="0" y="0"/>
-          <a:ext cx="0" cy="0"/>
-          <a:chOff x="0" y="0"/>
-          <a:chExt cx="0" cy="0"/>
-        </a:xfrm>
-      </p:grpSpPr>
-      <p:sp>
-        <p:nvSpPr>
-          <p:cNvPr id="2" name="Title 1"/>
-          <p:cNvSpPr>
-            <a:spLocks noGrp="1"/>
-          </p:cNvSpPr>
-          <p:nvPr>
-            <p:ph type="title"/>
-          </p:nvPr>
-        </p:nvSpPr>
-        <p:spPr/>
-        <p:txBody>
-          <a:bodyPr/>
-          <a:lstStyle/>
-          <a:p>
-            <a:r>
-              <a:rPr lang="en-US" dirty="0"/>
-              <a:t>Wednesday, February 5</a:t>
-            </a:r>
-          </a:p>
-        </p:txBody>
-      </p:sp>
-      <p:sp>
-        <p:nvSpPr>
-          <p:cNvPr id="3" name="Content Placeholder 2"/>
-          <p:cNvSpPr>
-            <a:spLocks noGrp="1"/>
-          </p:cNvSpPr>
-          <p:nvPr>
-            <p:ph idx="1"/>
-          </p:nvPr>
-        </p:nvSpPr>
-        <p:spPr/>
-        <p:txBody>
-          <a:bodyPr/>
-          <a:lstStyle/>
-          <a:p>
-            <a:r>
-              <a:rPr lang="en-US" sz="2600" dirty="0"/>
-              <a:t>We have a </a:t>
-            </a:r>
-            <a:r>
-              <a:rPr lang="en-US" sz="2600" b="1" i="1" dirty="0"/>
-              <a:t>plan</a:t>
-            </a:r>
-            <a:r>
-              <a:rPr lang="en-US" sz="2600" dirty="0"/>
-              <a:t> for hw2. Remember to get that submitted to me, TA, or on Collab by Friday. </a:t>
-            </a:r>
-            <a:endParaRPr lang="en-US" sz="1800" dirty="0"/>
-          </a:p>
-          <a:p>
-            <a:r>
-              <a:rPr lang="en-US" sz="2600" dirty="0"/>
-              <a:t>Back to poison things today</a:t>
-            </a:r>
-          </a:p>
-          <a:p>
-            <a:r>
-              <a:rPr lang="en-US" sz="2600" dirty="0"/>
-              <a:t>Lab this week:</a:t>
-            </a:r>
-          </a:p>
-          <a:p>
-            <a:pPr lvl="1"/>
-            <a:r>
-              <a:rPr lang="en-US" sz="2200" dirty="0"/>
-              <a:t>Finish and show off hw2 code. Reshuffle groups.</a:t>
-            </a:r>
-          </a:p>
-          <a:p>
-            <a:r>
-              <a:rPr lang="en-US" sz="2600" dirty="0"/>
-              <a:t>Policy change going forward:</a:t>
-            </a:r>
-          </a:p>
-          <a:p>
-            <a:pPr lvl="1"/>
-            <a:r>
-              <a:rPr lang="en-US" sz="2200" dirty="0"/>
-              <a:t>For group project, 2/2 is considered passing. If you don’t earn at least a 1 on initial submission, then you can’t resubmit to raise the grade. This will help ensure everyone puts effort in by intended deadline.</a:t>
-            </a:r>
-          </a:p>
-          <a:p>
-            <a:r>
-              <a:rPr lang="en-US" sz="2600" dirty="0"/>
-              <a:t>Lecture today is finishing </a:t>
-            </a:r>
-            <a:r>
-              <a:rPr lang="en-US" sz="2600" b="1" i="1" dirty="0"/>
-              <a:t>What is a game</a:t>
-            </a:r>
-            <a:r>
-              <a:rPr lang="en-US" sz="2600" dirty="0"/>
-              <a:t>? and then talking about </a:t>
-            </a:r>
-            <a:r>
-              <a:rPr lang="en-US" sz="2600" b="1" i="1" dirty="0"/>
-              <a:t>character design</a:t>
-            </a:r>
-            <a:r>
-              <a:rPr lang="en-US" sz="2600" dirty="0"/>
-              <a:t>.</a:t>
-            </a:r>
-          </a:p>
-        </p:txBody>
-      </p:sp>
-      <p:sp>
-        <p:nvSpPr>
-          <p:cNvPr id="4" name="Footer Placeholder 3"/>
-          <p:cNvSpPr>
-            <a:spLocks noGrp="1"/>
-          </p:cNvSpPr>
-          <p:nvPr>
-            <p:ph type="ftr" sz="quarter" idx="10"/>
-          </p:nvPr>
-        </p:nvSpPr>
-        <p:spPr/>
-        <p:txBody>
-          <a:bodyPr/>
-          <a:lstStyle/>
-          <a:p>
-            <a:fld id="{D0357299-C40C-42AB-B0C0-2E6E0A5A7F61}" type="slidenum">
-              <a:rPr lang="en-US" altLang="zh-CN" smtClean="0"/>
-              <a:pPr/>
-              <a:t>7</a:t>
-            </a:fld>
-            <a:endParaRPr lang="en-US" altLang="zh-CN"/>
-          </a:p>
-        </p:txBody>
-      </p:sp>
-    </p:spTree>
-    <p:extLst>
-      <p:ext uri="{BB962C8B-B14F-4D97-AF65-F5344CB8AC3E}">
-        <p14:creationId xmlns:p14="http://schemas.microsoft.com/office/powerpoint/2010/main" val="1185574925"/>
-      </p:ext>
-    </p:extLst>
-  </p:cSld>
-  <p:clrMapOvr>
-    <a:masterClrMapping/>
-  </p:clrMapOvr>
-</p:sld>
-</file>
-
-<file path=ppt/slides/slide8.xml><?xml version="1.0" encoding="utf-8"?>
-<p:sld xmlns:a="http://schemas.openxmlformats.org/drawingml/2006/main" xmlns:r="http://schemas.openxmlformats.org/officeDocument/2006/relationships" xmlns:p="http://schemas.openxmlformats.org/presentationml/2006/main">
-  <p:cSld>
-    <p:spTree>
-      <p:nvGrpSpPr>
-        <p:cNvPr id="1" name=""/>
-        <p:cNvGrpSpPr/>
-        <p:nvPr/>
-      </p:nvGrpSpPr>
-      <p:grpSpPr>
-        <a:xfrm>
-          <a:off x="0" y="0"/>
-          <a:ext cx="0" cy="0"/>
-          <a:chOff x="0" y="0"/>
-          <a:chExt cx="0" cy="0"/>
-        </a:xfrm>
-      </p:grpSpPr>
-      <p:sp>
-        <p:nvSpPr>
-          <p:cNvPr id="2" name="Title 1"/>
-          <p:cNvSpPr>
-            <a:spLocks noGrp="1"/>
-          </p:cNvSpPr>
-          <p:nvPr>
-            <p:ph type="title"/>
-          </p:nvPr>
-        </p:nvSpPr>
-        <p:spPr/>
-        <p:txBody>
-          <a:bodyPr/>
-          <a:lstStyle/>
-          <a:p>
-            <a:r>
-              <a:rPr lang="en-US" dirty="0"/>
-              <a:t>Monday, February 10</a:t>
-            </a:r>
-          </a:p>
-        </p:txBody>
-      </p:sp>
-      <p:sp>
-        <p:nvSpPr>
-          <p:cNvPr id="3" name="Content Placeholder 2"/>
-          <p:cNvSpPr>
-            <a:spLocks noGrp="1"/>
-          </p:cNvSpPr>
-          <p:nvPr>
-            <p:ph idx="1"/>
-          </p:nvPr>
-        </p:nvSpPr>
-        <p:spPr/>
-        <p:txBody>
-          <a:bodyPr/>
-          <a:lstStyle/>
-          <a:p>
-            <a:r>
-              <a:rPr lang="en-US" sz="2600" dirty="0"/>
-              <a:t>HW 1 and 2 are submitted and done (finally!)</a:t>
-            </a:r>
-          </a:p>
-          <a:p>
-            <a:pPr lvl="1"/>
-            <a:r>
-              <a:rPr lang="en-US" sz="2200" dirty="0"/>
-              <a:t>Should be graded soon (many of them already are)</a:t>
-            </a:r>
-          </a:p>
-          <a:p>
-            <a:pPr lvl="1"/>
-            <a:r>
-              <a:rPr lang="en-US" sz="2200" dirty="0"/>
-              <a:t>HW 1 grade should equal max(hw1, hw2). If not tell us.</a:t>
-            </a:r>
-          </a:p>
-          <a:p>
-            <a:r>
-              <a:rPr lang="en-US" sz="2600" dirty="0"/>
-              <a:t>Back to poisoning things today</a:t>
-            </a:r>
-          </a:p>
-          <a:p>
-            <a:r>
-              <a:rPr lang="en-US" sz="2600" dirty="0"/>
-              <a:t>Lab this week:</a:t>
-            </a:r>
-          </a:p>
-          <a:p>
-            <a:pPr lvl="1"/>
-            <a:r>
-              <a:rPr lang="en-US" sz="2200" dirty="0"/>
-              <a:t>First group assignment. Every group must have a discussion with </a:t>
-            </a:r>
-            <a:r>
-              <a:rPr lang="en-US" sz="2200" dirty="0" err="1"/>
-              <a:t>Tas</a:t>
-            </a:r>
-            <a:r>
-              <a:rPr lang="en-US" sz="2200" dirty="0"/>
-              <a:t> about design of game, moving forward, etc.</a:t>
-            </a:r>
-          </a:p>
-          <a:p>
-            <a:pPr lvl="1"/>
-            <a:r>
-              <a:rPr lang="en-US" sz="2200" dirty="0"/>
-              <a:t>Next week will be our first group presentations in lab.</a:t>
-            </a:r>
-          </a:p>
-          <a:p>
-            <a:r>
-              <a:rPr lang="en-US" sz="2600" dirty="0"/>
-              <a:t>Lecture today is finishing </a:t>
-            </a:r>
-            <a:r>
-              <a:rPr lang="en-US" sz="2600" b="1" i="1" dirty="0"/>
-              <a:t>enemy and </a:t>
-            </a:r>
-            <a:r>
-              <a:rPr lang="en-US" sz="2600" b="1" i="1" dirty="0" err="1"/>
-              <a:t>npc</a:t>
-            </a:r>
-            <a:r>
-              <a:rPr lang="en-US" sz="2600" b="1" i="1" dirty="0"/>
-              <a:t> design/development</a:t>
-            </a:r>
-            <a:r>
-              <a:rPr lang="en-US" sz="2600" dirty="0"/>
-              <a:t>.</a:t>
-            </a:r>
-          </a:p>
-        </p:txBody>
-      </p:sp>
-      <p:sp>
-        <p:nvSpPr>
-          <p:cNvPr id="4" name="Footer Placeholder 3"/>
-          <p:cNvSpPr>
-            <a:spLocks noGrp="1"/>
-          </p:cNvSpPr>
-          <p:nvPr>
-            <p:ph type="ftr" sz="quarter" idx="10"/>
-          </p:nvPr>
-        </p:nvSpPr>
-        <p:spPr/>
-        <p:txBody>
-          <a:bodyPr/>
-          <a:lstStyle/>
-          <a:p>
-            <a:fld id="{D0357299-C40C-42AB-B0C0-2E6E0A5A7F61}" type="slidenum">
-              <a:rPr lang="en-US" altLang="zh-CN" smtClean="0"/>
-              <a:pPr/>
-              <a:t>8</a:t>
-            </a:fld>
-            <a:endParaRPr lang="en-US" altLang="zh-CN"/>
-          </a:p>
-        </p:txBody>
-      </p:sp>
-    </p:spTree>
-    <p:extLst>
-      <p:ext uri="{BB962C8B-B14F-4D97-AF65-F5344CB8AC3E}">
-        <p14:creationId xmlns:p14="http://schemas.microsoft.com/office/powerpoint/2010/main" val="2383785681"/>
-      </p:ext>
-    </p:extLst>
-  </p:cSld>
-  <p:clrMapOvr>
-    <a:masterClrMapping/>
-  </p:clrMapOvr>
-</p:sld>
-</file>
-
-<file path=ppt/slides/slide9.xml><?xml version="1.0" encoding="utf-8"?>
-<p:sld xmlns:a="http://schemas.openxmlformats.org/drawingml/2006/main" xmlns:r="http://schemas.openxmlformats.org/officeDocument/2006/relationships" xmlns:p="http://schemas.openxmlformats.org/presentationml/2006/main">
-  <p:cSld>
-    <p:spTree>
-      <p:nvGrpSpPr>
-        <p:cNvPr id="1" name=""/>
-        <p:cNvGrpSpPr/>
-        <p:nvPr/>
-      </p:nvGrpSpPr>
-      <p:grpSpPr>
-        <a:xfrm>
-          <a:off x="0" y="0"/>
-          <a:ext cx="0" cy="0"/>
-          <a:chOff x="0" y="0"/>
-          <a:chExt cx="0" cy="0"/>
-        </a:xfrm>
-      </p:grpSpPr>
-      <p:sp>
-        <p:nvSpPr>
-          <p:cNvPr id="2" name="Title 1"/>
-          <p:cNvSpPr>
-            <a:spLocks noGrp="1"/>
-          </p:cNvSpPr>
-          <p:nvPr>
-            <p:ph type="title"/>
-          </p:nvPr>
-        </p:nvSpPr>
-        <p:spPr/>
-        <p:txBody>
-          <a:bodyPr/>
-          <a:lstStyle/>
-          <a:p>
-            <a:r>
-              <a:rPr lang="en-US" dirty="0"/>
-              <a:t>Wednesday, February 12</a:t>
-            </a:r>
-          </a:p>
-        </p:txBody>
-      </p:sp>
-      <p:sp>
-        <p:nvSpPr>
-          <p:cNvPr id="3" name="Content Placeholder 2"/>
-          <p:cNvSpPr>
-            <a:spLocks noGrp="1"/>
-          </p:cNvSpPr>
-          <p:nvPr>
-            <p:ph idx="1"/>
-          </p:nvPr>
-        </p:nvSpPr>
-        <p:spPr/>
-        <p:txBody>
-          <a:bodyPr/>
-          <a:lstStyle/>
-          <a:p>
-            <a:r>
-              <a:rPr lang="en-US" sz="2600" dirty="0"/>
-              <a:t>Haven’t posted solutions yet. I’m slow</a:t>
-            </a:r>
-            <a:r>
-              <a:rPr lang="en-US" sz="2200" dirty="0"/>
-              <a:t>.</a:t>
-            </a:r>
-          </a:p>
-          <a:p>
-            <a:r>
-              <a:rPr lang="en-US" sz="2600" dirty="0"/>
-              <a:t>Back to poisoning things today</a:t>
-            </a:r>
-          </a:p>
-          <a:p>
-            <a:r>
-              <a:rPr lang="en-US" sz="2600" dirty="0"/>
-              <a:t>Lab this week:</a:t>
-            </a:r>
-          </a:p>
-          <a:p>
-            <a:pPr lvl="1"/>
-            <a:r>
-              <a:rPr lang="en-US" sz="2200" dirty="0"/>
-              <a:t>First group assignment. Every group must have a discussion with </a:t>
-            </a:r>
-            <a:r>
-              <a:rPr lang="en-US" sz="2200" dirty="0" err="1"/>
-              <a:t>Tas</a:t>
-            </a:r>
-            <a:r>
-              <a:rPr lang="en-US" sz="2200" dirty="0"/>
-              <a:t> about design of game, moving forward, etc.</a:t>
-            </a:r>
-          </a:p>
-          <a:p>
-            <a:pPr lvl="1"/>
-            <a:r>
-              <a:rPr lang="en-US" sz="2200" dirty="0"/>
-              <a:t>Notify TA of the sub-teams for your group</a:t>
-            </a:r>
-          </a:p>
-          <a:p>
-            <a:pPr lvl="1"/>
-            <a:r>
-              <a:rPr lang="en-US" sz="2200" dirty="0"/>
-              <a:t>Next week will be our first group presentations in lab.</a:t>
-            </a:r>
-          </a:p>
-          <a:p>
-            <a:r>
-              <a:rPr lang="en-US" sz="2600" dirty="0"/>
-              <a:t>Lecture today is finishing </a:t>
-            </a:r>
-            <a:r>
-              <a:rPr lang="en-US" sz="2600" b="1" i="1" dirty="0"/>
-              <a:t>enemy and </a:t>
-            </a:r>
-            <a:r>
-              <a:rPr lang="en-US" sz="2600" b="1" i="1" dirty="0" err="1"/>
-              <a:t>npc</a:t>
-            </a:r>
-            <a:r>
-              <a:rPr lang="en-US" sz="2600" b="1" i="1" dirty="0"/>
-              <a:t> design/development </a:t>
-            </a:r>
-            <a:r>
-              <a:rPr lang="en-US" sz="2600" dirty="0"/>
-              <a:t>and moving on to </a:t>
-            </a:r>
-            <a:r>
-              <a:rPr lang="en-US" sz="2600" b="1" i="1" dirty="0"/>
-              <a:t>History of Games</a:t>
-            </a:r>
-            <a:endParaRPr lang="en-US" sz="2600" dirty="0"/>
-          </a:p>
-        </p:txBody>
-      </p:sp>
-      <p:sp>
-        <p:nvSpPr>
-          <p:cNvPr id="4" name="Footer Placeholder 3"/>
-          <p:cNvSpPr>
-            <a:spLocks noGrp="1"/>
-          </p:cNvSpPr>
-          <p:nvPr>
-            <p:ph type="ftr" sz="quarter" idx="10"/>
-          </p:nvPr>
-        </p:nvSpPr>
-        <p:spPr/>
-        <p:txBody>
-          <a:bodyPr/>
-          <a:lstStyle/>
-          <a:p>
-            <a:fld id="{D0357299-C40C-42AB-B0C0-2E6E0A5A7F61}" type="slidenum">
-              <a:rPr lang="en-US" altLang="zh-CN" smtClean="0"/>
-              <a:pPr/>
-              <a:t>9</a:t>
-            </a:fld>
-            <a:endParaRPr lang="en-US" altLang="zh-CN"/>
-          </a:p>
-        </p:txBody>
-      </p:sp>
-    </p:spTree>
-    <p:extLst>
-      <p:ext uri="{BB962C8B-B14F-4D97-AF65-F5344CB8AC3E}">
-        <p14:creationId xmlns:p14="http://schemas.microsoft.com/office/powerpoint/2010/main" val="3249700424"/>
       </p:ext>
     </p:extLst>
   </p:cSld>

</xml_diff>

<commit_message>
adding project groups, remaking assignments
</commit_message>
<xml_diff>
--- a/slides/dailyAnnouncements.pptx
+++ b/slides/dailyAnnouncements.pptx
@@ -5,15 +5,16 @@
     <p:sldMasterId id="2147483648" r:id="rId1"/>
   </p:sldMasterIdLst>
   <p:notesMasterIdLst>
-    <p:notesMasterId r:id="rId5"/>
+    <p:notesMasterId r:id="rId6"/>
   </p:notesMasterIdLst>
   <p:handoutMasterIdLst>
-    <p:handoutMasterId r:id="rId6"/>
+    <p:handoutMasterId r:id="rId7"/>
   </p:handoutMasterIdLst>
   <p:sldIdLst>
     <p:sldId id="283" r:id="rId2"/>
     <p:sldId id="286" r:id="rId3"/>
     <p:sldId id="287" r:id="rId4"/>
+    <p:sldId id="288" r:id="rId5"/>
   </p:sldIdLst>
   <p:sldSz cx="9144000" cy="6858000" type="screen4x3"/>
   <p:notesSz cx="7099300" cy="9385300"/>
@@ -4347,6 +4348,176 @@
     <p:extLst>
       <p:ext uri="{BB962C8B-B14F-4D97-AF65-F5344CB8AC3E}">
         <p14:creationId xmlns:p14="http://schemas.microsoft.com/office/powerpoint/2010/main" val="2545212781"/>
+      </p:ext>
+    </p:extLst>
+  </p:cSld>
+  <p:clrMapOvr>
+    <a:masterClrMapping/>
+  </p:clrMapOvr>
+</p:sld>
+</file>
+
+<file path=ppt/slides/slide4.xml><?xml version="1.0" encoding="utf-8"?>
+<p:sld xmlns:a="http://schemas.openxmlformats.org/drawingml/2006/main" xmlns:r="http://schemas.openxmlformats.org/officeDocument/2006/relationships" xmlns:p="http://schemas.openxmlformats.org/presentationml/2006/main">
+  <p:cSld>
+    <p:spTree>
+      <p:nvGrpSpPr>
+        <p:cNvPr id="1" name=""/>
+        <p:cNvGrpSpPr/>
+        <p:nvPr/>
+      </p:nvGrpSpPr>
+      <p:grpSpPr>
+        <a:xfrm>
+          <a:off x="0" y="0"/>
+          <a:ext cx="0" cy="0"/>
+          <a:chOff x="0" y="0"/>
+          <a:chExt cx="0" cy="0"/>
+        </a:xfrm>
+      </p:grpSpPr>
+      <p:sp>
+        <p:nvSpPr>
+          <p:cNvPr id="2" name="Title 1"/>
+          <p:cNvSpPr>
+            <a:spLocks noGrp="1"/>
+          </p:cNvSpPr>
+          <p:nvPr>
+            <p:ph type="title"/>
+          </p:nvPr>
+        </p:nvSpPr>
+        <p:spPr/>
+        <p:txBody>
+          <a:bodyPr/>
+          <a:lstStyle/>
+          <a:p>
+            <a:r>
+              <a:rPr lang="en-US" dirty="0"/>
+              <a:t>Thursday, September 3</a:t>
+            </a:r>
+          </a:p>
+        </p:txBody>
+      </p:sp>
+      <p:sp>
+        <p:nvSpPr>
+          <p:cNvPr id="3" name="Content Placeholder 2"/>
+          <p:cNvSpPr>
+            <a:spLocks noGrp="1"/>
+          </p:cNvSpPr>
+          <p:nvPr>
+            <p:ph idx="1"/>
+          </p:nvPr>
+        </p:nvSpPr>
+        <p:spPr/>
+        <p:txBody>
+          <a:bodyPr/>
+          <a:lstStyle/>
+          <a:p>
+            <a:r>
+              <a:rPr lang="en-US" sz="2200" dirty="0"/>
+              <a:t>TAs have setup a Discord server for us. </a:t>
+            </a:r>
+            <a:endParaRPr lang="en-US" sz="1800" dirty="0"/>
+          </a:p>
+          <a:p>
+            <a:pPr lvl="1"/>
+            <a:r>
+              <a:rPr lang="en-US" sz="1800" dirty="0"/>
+              <a:t>Piazza has been put back on Collab for general questions / answer</a:t>
+            </a:r>
+          </a:p>
+          <a:p>
+            <a:r>
+              <a:rPr lang="en-US" sz="2200" dirty="0"/>
+              <a:t>Homework 1: Game Loop is all set up on course website</a:t>
+            </a:r>
+          </a:p>
+          <a:p>
+            <a:pPr lvl="1"/>
+            <a:r>
+              <a:rPr lang="en-US" sz="1800" dirty="0" err="1"/>
+              <a:t>Github</a:t>
+            </a:r>
+            <a:r>
+              <a:rPr lang="en-US" sz="1800" dirty="0"/>
+              <a:t> classroom configured for HW 1 and 2. Any issues with it so far?</a:t>
+            </a:r>
+          </a:p>
+          <a:p>
+            <a:pPr lvl="1"/>
+            <a:r>
+              <a:rPr lang="en-US" sz="1800" dirty="0"/>
+              <a:t>Homework 1 is meant to be a fun programming warm-up. You are also meant to be CREATIVE (gasp!!)</a:t>
+            </a:r>
+          </a:p>
+          <a:p>
+            <a:pPr lvl="1"/>
+            <a:r>
+              <a:rPr lang="en-US" sz="1800" dirty="0"/>
+              <a:t>Due date is next Thursday at 11:59pm. This means you are guaranteed grading / feedback after that deadline. Remember, can resubmit in OH or at hard deadline in October. </a:t>
+            </a:r>
+          </a:p>
+          <a:p>
+            <a:r>
+              <a:rPr lang="en-US" sz="2200" dirty="0"/>
+              <a:t>Groups: Need to establish these by end of this week.</a:t>
+            </a:r>
+          </a:p>
+          <a:p>
+            <a:pPr lvl="1"/>
+            <a:r>
+              <a:rPr lang="en-US" sz="1800" dirty="0"/>
+              <a:t>I sent around a spreadsheet. Please fill it out.</a:t>
+            </a:r>
+          </a:p>
+          <a:p>
+            <a:pPr lvl="1"/>
+            <a:r>
+              <a:rPr lang="en-US" sz="1800" dirty="0"/>
+              <a:t>Everyone’s name needs to be on the spreadsheet one way or another.</a:t>
+            </a:r>
+          </a:p>
+          <a:p>
+            <a:pPr lvl="1"/>
+            <a:r>
+              <a:rPr lang="en-US" sz="1800" dirty="0"/>
+              <a:t>We will be finalizing groups over the weekend.</a:t>
+            </a:r>
+          </a:p>
+          <a:p>
+            <a:r>
+              <a:rPr lang="en-US" sz="2200" dirty="0"/>
+              <a:t>Next homework: Group Project Design Document</a:t>
+            </a:r>
+          </a:p>
+        </p:txBody>
+      </p:sp>
+      <p:sp>
+        <p:nvSpPr>
+          <p:cNvPr id="4" name="Footer Placeholder 3"/>
+          <p:cNvSpPr>
+            <a:spLocks noGrp="1"/>
+          </p:cNvSpPr>
+          <p:nvPr>
+            <p:ph type="ftr" sz="quarter" idx="10"/>
+          </p:nvPr>
+        </p:nvSpPr>
+        <p:spPr/>
+        <p:txBody>
+          <a:bodyPr/>
+          <a:lstStyle/>
+          <a:p>
+            <a:fld id="{D0357299-C40C-42AB-B0C0-2E6E0A5A7F61}" type="slidenum">
+              <a:rPr lang="en-US" altLang="zh-CN" smtClean="0"/>
+              <a:pPr/>
+              <a:t>4</a:t>
+            </a:fld>
+            <a:endParaRPr lang="en-US" altLang="zh-CN"/>
+          </a:p>
+        </p:txBody>
+      </p:sp>
+    </p:spTree>
+    <p:extLst>
+      <p:ext uri="{BB962C8B-B14F-4D97-AF65-F5344CB8AC3E}">
+        <p14:creationId xmlns:p14="http://schemas.microsoft.com/office/powerpoint/2010/main" val="588896829"/>
       </p:ext>
     </p:extLst>
   </p:cSld>

</xml_diff>

<commit_message>
Addign metroid links to slides page
</commit_message>
<xml_diff>
--- a/slides/dailyAnnouncements.pptx
+++ b/slides/dailyAnnouncements.pptx
@@ -5,16 +5,17 @@
     <p:sldMasterId id="2147483648" r:id="rId1"/>
   </p:sldMasterIdLst>
   <p:notesMasterIdLst>
-    <p:notesMasterId r:id="rId6"/>
+    <p:notesMasterId r:id="rId7"/>
   </p:notesMasterIdLst>
   <p:handoutMasterIdLst>
-    <p:handoutMasterId r:id="rId7"/>
+    <p:handoutMasterId r:id="rId8"/>
   </p:handoutMasterIdLst>
   <p:sldIdLst>
     <p:sldId id="283" r:id="rId2"/>
     <p:sldId id="286" r:id="rId3"/>
     <p:sldId id="287" r:id="rId4"/>
     <p:sldId id="288" r:id="rId5"/>
+    <p:sldId id="289" r:id="rId6"/>
   </p:sldIdLst>
   <p:sldSz cx="9144000" cy="6858000" type="screen4x3"/>
   <p:notesSz cx="7099300" cy="9385300"/>
@@ -4518,6 +4519,200 @@
     <p:extLst>
       <p:ext uri="{BB962C8B-B14F-4D97-AF65-F5344CB8AC3E}">
         <p14:creationId xmlns:p14="http://schemas.microsoft.com/office/powerpoint/2010/main" val="588896829"/>
+      </p:ext>
+    </p:extLst>
+  </p:cSld>
+  <p:clrMapOvr>
+    <a:masterClrMapping/>
+  </p:clrMapOvr>
+</p:sld>
+</file>
+
+<file path=ppt/slides/slide5.xml><?xml version="1.0" encoding="utf-8"?>
+<p:sld xmlns:a="http://schemas.openxmlformats.org/drawingml/2006/main" xmlns:r="http://schemas.openxmlformats.org/officeDocument/2006/relationships" xmlns:p="http://schemas.openxmlformats.org/presentationml/2006/main">
+  <p:cSld>
+    <p:spTree>
+      <p:nvGrpSpPr>
+        <p:cNvPr id="1" name=""/>
+        <p:cNvGrpSpPr/>
+        <p:nvPr/>
+      </p:nvGrpSpPr>
+      <p:grpSpPr>
+        <a:xfrm>
+          <a:off x="0" y="0"/>
+          <a:ext cx="0" cy="0"/>
+          <a:chOff x="0" y="0"/>
+          <a:chExt cx="0" cy="0"/>
+        </a:xfrm>
+      </p:grpSpPr>
+      <p:sp>
+        <p:nvSpPr>
+          <p:cNvPr id="2" name="Title 1"/>
+          <p:cNvSpPr>
+            <a:spLocks noGrp="1"/>
+          </p:cNvSpPr>
+          <p:nvPr>
+            <p:ph type="title"/>
+          </p:nvPr>
+        </p:nvSpPr>
+        <p:spPr/>
+        <p:txBody>
+          <a:bodyPr/>
+          <a:lstStyle/>
+          <a:p>
+            <a:r>
+              <a:rPr lang="en-US" dirty="0"/>
+              <a:t>Tuesday, September 8</a:t>
+            </a:r>
+          </a:p>
+        </p:txBody>
+      </p:sp>
+      <p:sp>
+        <p:nvSpPr>
+          <p:cNvPr id="3" name="Content Placeholder 2"/>
+          <p:cNvSpPr>
+            <a:spLocks noGrp="1"/>
+          </p:cNvSpPr>
+          <p:nvPr>
+            <p:ph idx="1"/>
+          </p:nvPr>
+        </p:nvSpPr>
+        <p:spPr/>
+        <p:txBody>
+          <a:bodyPr/>
+          <a:lstStyle/>
+          <a:p>
+            <a:r>
+              <a:rPr lang="en-US" sz="2200" dirty="0"/>
+              <a:t>TAs have setup a Discord server for us. </a:t>
+            </a:r>
+            <a:endParaRPr lang="en-US" sz="1800" dirty="0"/>
+          </a:p>
+          <a:p>
+            <a:pPr lvl="1"/>
+            <a:r>
+              <a:rPr lang="en-US" sz="1800" dirty="0"/>
+              <a:t>Piazza has been put back on Collab for general questions / answer</a:t>
+            </a:r>
+          </a:p>
+          <a:p>
+            <a:r>
+              <a:rPr lang="en-US" sz="2200" dirty="0"/>
+              <a:t>Homework 1: Game Loop is all set up on course website</a:t>
+            </a:r>
+          </a:p>
+          <a:p>
+            <a:pPr lvl="1"/>
+            <a:r>
+              <a:rPr lang="en-US" sz="1800" dirty="0"/>
+              <a:t>It is due this Thursday at midnight for feedback.</a:t>
+            </a:r>
+          </a:p>
+          <a:p>
+            <a:pPr lvl="1"/>
+            <a:r>
+              <a:rPr lang="en-US" sz="1800" dirty="0"/>
+              <a:t>You have one more submission attempt (last chance) if you don’t pass it.</a:t>
+            </a:r>
+          </a:p>
+          <a:p>
+            <a:r>
+              <a:rPr lang="en-US" sz="2200" dirty="0"/>
+              <a:t>Groups: have been established. </a:t>
+            </a:r>
+          </a:p>
+          <a:p>
+            <a:pPr lvl="1"/>
+            <a:r>
+              <a:rPr lang="en-US" sz="1800" dirty="0"/>
+              <a:t>They are on the course website (</a:t>
+            </a:r>
+            <a:r>
+              <a:rPr lang="en-US" sz="1800" dirty="0" err="1"/>
+              <a:t>homeworks</a:t>
+            </a:r>
+            <a:r>
+              <a:rPr lang="en-US" sz="1800" dirty="0"/>
+              <a:t> page)</a:t>
+            </a:r>
+          </a:p>
+          <a:p>
+            <a:pPr lvl="1"/>
+            <a:r>
+              <a:rPr lang="en-US" sz="1800" dirty="0"/>
+              <a:t>Let me (or any TA) know within 48 hours if there are any problems</a:t>
+            </a:r>
+          </a:p>
+          <a:p>
+            <a:pPr lvl="1"/>
+            <a:r>
+              <a:rPr lang="en-US" sz="1800" dirty="0"/>
+              <a:t>We will setup the group assignments on </a:t>
+            </a:r>
+            <a:r>
+              <a:rPr lang="en-US" sz="1800" dirty="0" err="1"/>
+              <a:t>Github</a:t>
+            </a:r>
+            <a:r>
+              <a:rPr lang="en-US" sz="1800" dirty="0"/>
+              <a:t> classroom once finalized</a:t>
+            </a:r>
+          </a:p>
+          <a:p>
+            <a:r>
+              <a:rPr lang="en-US" sz="2200" dirty="0"/>
+              <a:t>First Group HW: Design Document</a:t>
+            </a:r>
+          </a:p>
+          <a:p>
+            <a:pPr lvl="1"/>
+            <a:r>
+              <a:rPr lang="en-US" sz="1800" dirty="0"/>
+              <a:t>Due two weeks from Thursday. Start thinking about your game’s mechanics and brainstorming simple level design set pieces (today’s lecture will help)</a:t>
+            </a:r>
+          </a:p>
+          <a:p>
+            <a:r>
+              <a:rPr lang="en-US" sz="2200" dirty="0"/>
+              <a:t>Remember: Get and read “reality is broken”, readings on slides page.</a:t>
+            </a:r>
+          </a:p>
+          <a:p>
+            <a:r>
+              <a:rPr lang="en-US" sz="2200" dirty="0"/>
+              <a:t>Today: Let’s play Super Metroid!!</a:t>
+            </a:r>
+          </a:p>
+        </p:txBody>
+      </p:sp>
+      <p:sp>
+        <p:nvSpPr>
+          <p:cNvPr id="4" name="Footer Placeholder 3"/>
+          <p:cNvSpPr>
+            <a:spLocks noGrp="1"/>
+          </p:cNvSpPr>
+          <p:nvPr>
+            <p:ph type="ftr" sz="quarter" idx="10"/>
+          </p:nvPr>
+        </p:nvSpPr>
+        <p:spPr/>
+        <p:txBody>
+          <a:bodyPr/>
+          <a:lstStyle/>
+          <a:p>
+            <a:fld id="{D0357299-C40C-42AB-B0C0-2E6E0A5A7F61}" type="slidenum">
+              <a:rPr lang="en-US" altLang="zh-CN" smtClean="0"/>
+              <a:pPr/>
+              <a:t>5</a:t>
+            </a:fld>
+            <a:endParaRPr lang="en-US" altLang="zh-CN"/>
+          </a:p>
+        </p:txBody>
+      </p:sp>
+    </p:spTree>
+    <p:extLst>
+      <p:ext uri="{BB962C8B-B14F-4D97-AF65-F5344CB8AC3E}">
+        <p14:creationId xmlns:p14="http://schemas.microsoft.com/office/powerpoint/2010/main" val="2354365930"/>
       </p:ext>
     </p:extLst>
   </p:cSld>

</xml_diff>

<commit_message>
hw 3 polish. linking to groups spreadsheet
</commit_message>
<xml_diff>
--- a/slides/dailyAnnouncements.pptx
+++ b/slides/dailyAnnouncements.pptx
@@ -5,10 +5,10 @@
     <p:sldMasterId id="2147483648" r:id="rId1"/>
   </p:sldMasterIdLst>
   <p:notesMasterIdLst>
-    <p:notesMasterId r:id="rId7"/>
+    <p:notesMasterId r:id="rId8"/>
   </p:notesMasterIdLst>
   <p:handoutMasterIdLst>
-    <p:handoutMasterId r:id="rId8"/>
+    <p:handoutMasterId r:id="rId9"/>
   </p:handoutMasterIdLst>
   <p:sldIdLst>
     <p:sldId id="283" r:id="rId2"/>
@@ -16,6 +16,7 @@
     <p:sldId id="287" r:id="rId4"/>
     <p:sldId id="288" r:id="rId5"/>
     <p:sldId id="289" r:id="rId6"/>
+    <p:sldId id="290" r:id="rId7"/>
   </p:sldIdLst>
   <p:sldSz cx="9144000" cy="6858000" type="screen4x3"/>
   <p:notesSz cx="7099300" cy="9385300"/>
@@ -4713,6 +4714,201 @@
     <p:extLst>
       <p:ext uri="{BB962C8B-B14F-4D97-AF65-F5344CB8AC3E}">
         <p14:creationId xmlns:p14="http://schemas.microsoft.com/office/powerpoint/2010/main" val="2354365930"/>
+      </p:ext>
+    </p:extLst>
+  </p:cSld>
+  <p:clrMapOvr>
+    <a:masterClrMapping/>
+  </p:clrMapOvr>
+</p:sld>
+</file>
+
+<file path=ppt/slides/slide6.xml><?xml version="1.0" encoding="utf-8"?>
+<p:sld xmlns:a="http://schemas.openxmlformats.org/drawingml/2006/main" xmlns:r="http://schemas.openxmlformats.org/officeDocument/2006/relationships" xmlns:p="http://schemas.openxmlformats.org/presentationml/2006/main">
+  <p:cSld>
+    <p:spTree>
+      <p:nvGrpSpPr>
+        <p:cNvPr id="1" name=""/>
+        <p:cNvGrpSpPr/>
+        <p:nvPr/>
+      </p:nvGrpSpPr>
+      <p:grpSpPr>
+        <a:xfrm>
+          <a:off x="0" y="0"/>
+          <a:ext cx="0" cy="0"/>
+          <a:chOff x="0" y="0"/>
+          <a:chExt cx="0" cy="0"/>
+        </a:xfrm>
+      </p:grpSpPr>
+      <p:sp>
+        <p:nvSpPr>
+          <p:cNvPr id="2" name="Title 1"/>
+          <p:cNvSpPr>
+            <a:spLocks noGrp="1"/>
+          </p:cNvSpPr>
+          <p:nvPr>
+            <p:ph type="title"/>
+          </p:nvPr>
+        </p:nvSpPr>
+        <p:spPr/>
+        <p:txBody>
+          <a:bodyPr/>
+          <a:lstStyle/>
+          <a:p>
+            <a:r>
+              <a:rPr lang="en-US" dirty="0"/>
+              <a:t>Tuesday, September 8</a:t>
+            </a:r>
+          </a:p>
+        </p:txBody>
+      </p:sp>
+      <p:sp>
+        <p:nvSpPr>
+          <p:cNvPr id="3" name="Content Placeholder 2"/>
+          <p:cNvSpPr>
+            <a:spLocks noGrp="1"/>
+          </p:cNvSpPr>
+          <p:nvPr>
+            <p:ph idx="1"/>
+          </p:nvPr>
+        </p:nvSpPr>
+        <p:spPr/>
+        <p:txBody>
+          <a:bodyPr/>
+          <a:lstStyle/>
+          <a:p>
+            <a:r>
+              <a:rPr lang="en-US" sz="2200" dirty="0"/>
+              <a:t>TAs have setup a Discord server for us. </a:t>
+            </a:r>
+            <a:endParaRPr lang="en-US" sz="1800" dirty="0"/>
+          </a:p>
+          <a:p>
+            <a:pPr lvl="1"/>
+            <a:r>
+              <a:rPr lang="en-US" sz="1800" dirty="0"/>
+              <a:t>Piazza has been put back on Collab for general questions / answer</a:t>
+            </a:r>
+          </a:p>
+          <a:p>
+            <a:pPr lvl="1"/>
+            <a:r>
+              <a:rPr lang="en-US" sz="1800" dirty="0"/>
+              <a:t>Please check discord for announcements and such.</a:t>
+            </a:r>
+          </a:p>
+          <a:p>
+            <a:r>
+              <a:rPr lang="en-US" sz="2200" dirty="0"/>
+              <a:t>Homework 1: Game Loop is all set up on course website</a:t>
+            </a:r>
+          </a:p>
+          <a:p>
+            <a:pPr lvl="1"/>
+            <a:r>
+              <a:rPr lang="en-US" sz="1800" dirty="0"/>
+              <a:t>It is due tonight. You can keep pushing afterwards.</a:t>
+            </a:r>
+          </a:p>
+          <a:p>
+            <a:pPr lvl="1"/>
+            <a:r>
+              <a:rPr lang="en-US" sz="1800" dirty="0"/>
+              <a:t>Feedback will be returned to you by end of weekend.</a:t>
+            </a:r>
+          </a:p>
+          <a:p>
+            <a:r>
+              <a:rPr lang="en-US" sz="2200" dirty="0"/>
+              <a:t>Groups: have been established. </a:t>
+            </a:r>
+          </a:p>
+          <a:p>
+            <a:pPr lvl="1"/>
+            <a:r>
+              <a:rPr lang="en-US" sz="1800" dirty="0"/>
+              <a:t>They are on the course website (</a:t>
+            </a:r>
+            <a:r>
+              <a:rPr lang="en-US" sz="1800" dirty="0" err="1"/>
+              <a:t>homeworks</a:t>
+            </a:r>
+            <a:r>
+              <a:rPr lang="en-US" sz="1800" dirty="0"/>
+              <a:t> page)</a:t>
+            </a:r>
+          </a:p>
+          <a:p>
+            <a:r>
+              <a:rPr lang="en-US" sz="2200" dirty="0"/>
+              <a:t>First Group HW: Design Document</a:t>
+            </a:r>
+          </a:p>
+          <a:p>
+            <a:pPr lvl="1"/>
+            <a:r>
+              <a:rPr lang="en-US" sz="1800" dirty="0"/>
+              <a:t>Due two weeks from today. Start thinking about your game’s mechanics and brainstorming simple level design set pieces</a:t>
+            </a:r>
+          </a:p>
+          <a:p>
+            <a:r>
+              <a:rPr lang="en-US" sz="2600" dirty="0"/>
+              <a:t>Remember: Get and read “reality is broken”, readings.</a:t>
+            </a:r>
+          </a:p>
+          <a:p>
+            <a:r>
+              <a:rPr lang="en-US" sz="2200" dirty="0"/>
+              <a:t>Today: </a:t>
+            </a:r>
+            <a:r>
+              <a:rPr lang="en-US" sz="2200" i="1" dirty="0"/>
+              <a:t>The Wrath of </a:t>
+            </a:r>
+            <a:r>
+              <a:rPr lang="en-US" sz="2200" i="1" dirty="0" err="1"/>
+              <a:t>Kann</a:t>
+            </a:r>
+            <a:r>
+              <a:rPr lang="en-US" sz="2200" i="1" dirty="0"/>
+              <a:t>: Celeste Edition</a:t>
+            </a:r>
+            <a:r>
+              <a:rPr lang="en-US" sz="2200" dirty="0"/>
+              <a:t>!!</a:t>
+            </a:r>
+          </a:p>
+        </p:txBody>
+      </p:sp>
+      <p:sp>
+        <p:nvSpPr>
+          <p:cNvPr id="4" name="Footer Placeholder 3"/>
+          <p:cNvSpPr>
+            <a:spLocks noGrp="1"/>
+          </p:cNvSpPr>
+          <p:nvPr>
+            <p:ph type="ftr" sz="quarter" idx="10"/>
+          </p:nvPr>
+        </p:nvSpPr>
+        <p:spPr/>
+        <p:txBody>
+          <a:bodyPr/>
+          <a:lstStyle/>
+          <a:p>
+            <a:fld id="{D0357299-C40C-42AB-B0C0-2E6E0A5A7F61}" type="slidenum">
+              <a:rPr lang="en-US" altLang="zh-CN" smtClean="0"/>
+              <a:pPr/>
+              <a:t>6</a:t>
+            </a:fld>
+            <a:endParaRPr lang="en-US" altLang="zh-CN"/>
+          </a:p>
+        </p:txBody>
+      </p:sp>
+    </p:spTree>
+    <p:extLst>
+      <p:ext uri="{BB962C8B-B14F-4D97-AF65-F5344CB8AC3E}">
+        <p14:creationId xmlns:p14="http://schemas.microsoft.com/office/powerpoint/2010/main" val="4141560485"/>
       </p:ext>
     </p:extLst>
   </p:cSld>

</xml_diff>

<commit_message>
new optional assignments. Slides for Thu.
</commit_message>
<xml_diff>
--- a/slides/dailyAnnouncements.pptx
+++ b/slides/dailyAnnouncements.pptx
@@ -5,10 +5,10 @@
     <p:sldMasterId id="2147483648" r:id="rId1"/>
   </p:sldMasterIdLst>
   <p:notesMasterIdLst>
-    <p:notesMasterId r:id="rId22"/>
+    <p:notesMasterId r:id="rId23"/>
   </p:notesMasterIdLst>
   <p:handoutMasterIdLst>
-    <p:handoutMasterId r:id="rId23"/>
+    <p:handoutMasterId r:id="rId24"/>
   </p:handoutMasterIdLst>
   <p:sldIdLst>
     <p:sldId id="283" r:id="rId2"/>
@@ -31,6 +31,7 @@
     <p:sldId id="302" r:id="rId19"/>
     <p:sldId id="303" r:id="rId20"/>
     <p:sldId id="304" r:id="rId21"/>
+    <p:sldId id="305" r:id="rId22"/>
   </p:sldIdLst>
   <p:sldSz cx="9144000" cy="6858000" type="screen4x3"/>
   <p:notesSz cx="7099300" cy="9385300"/>
@@ -5970,6 +5971,159 @@
     <p:extLst>
       <p:ext uri="{BB962C8B-B14F-4D97-AF65-F5344CB8AC3E}">
         <p14:creationId xmlns:p14="http://schemas.microsoft.com/office/powerpoint/2010/main" val="692433570"/>
+      </p:ext>
+    </p:extLst>
+  </p:cSld>
+  <p:clrMapOvr>
+    <a:masterClrMapping/>
+  </p:clrMapOvr>
+</p:sld>
+</file>
+
+<file path=ppt/slides/slide21.xml><?xml version="1.0" encoding="utf-8"?>
+<p:sld xmlns:a="http://schemas.openxmlformats.org/drawingml/2006/main" xmlns:r="http://schemas.openxmlformats.org/officeDocument/2006/relationships" xmlns:p="http://schemas.openxmlformats.org/presentationml/2006/main">
+  <p:cSld>
+    <p:spTree>
+      <p:nvGrpSpPr>
+        <p:cNvPr id="1" name=""/>
+        <p:cNvGrpSpPr/>
+        <p:nvPr/>
+      </p:nvGrpSpPr>
+      <p:grpSpPr>
+        <a:xfrm>
+          <a:off x="0" y="0"/>
+          <a:ext cx="0" cy="0"/>
+          <a:chOff x="0" y="0"/>
+          <a:chExt cx="0" cy="0"/>
+        </a:xfrm>
+      </p:grpSpPr>
+      <p:sp>
+        <p:nvSpPr>
+          <p:cNvPr id="2" name="Title 1"/>
+          <p:cNvSpPr>
+            <a:spLocks noGrp="1"/>
+          </p:cNvSpPr>
+          <p:nvPr>
+            <p:ph type="title"/>
+          </p:nvPr>
+        </p:nvSpPr>
+        <p:spPr/>
+        <p:txBody>
+          <a:bodyPr/>
+          <a:lstStyle/>
+          <a:p>
+            <a:r>
+              <a:rPr lang="en-US" dirty="0"/>
+              <a:t>Tuesday, November 10</a:t>
+            </a:r>
+          </a:p>
+        </p:txBody>
+      </p:sp>
+      <p:sp>
+        <p:nvSpPr>
+          <p:cNvPr id="3" name="Content Placeholder 2"/>
+          <p:cNvSpPr>
+            <a:spLocks noGrp="1"/>
+          </p:cNvSpPr>
+          <p:nvPr>
+            <p:ph idx="1"/>
+          </p:nvPr>
+        </p:nvSpPr>
+        <p:spPr/>
+        <p:txBody>
+          <a:bodyPr/>
+          <a:lstStyle/>
+          <a:p>
+            <a:r>
+              <a:rPr lang="en-US" sz="2200" dirty="0"/>
+              <a:t>Required HW grades are released. Optional points sort of released.</a:t>
+            </a:r>
+          </a:p>
+          <a:p>
+            <a:endParaRPr lang="en-US" sz="2200" dirty="0"/>
+          </a:p>
+          <a:p>
+            <a:r>
+              <a:rPr lang="en-US" sz="2200" dirty="0"/>
+              <a:t>Alpha deadline has passed. How did it go? You have until next Thursday for Beta build.</a:t>
+            </a:r>
+            <a:endParaRPr lang="en-US" sz="1000" dirty="0"/>
+          </a:p>
+          <a:p>
+            <a:endParaRPr lang="en-US" sz="2200" dirty="0"/>
+          </a:p>
+          <a:p>
+            <a:r>
+              <a:rPr lang="en-US" sz="2200" dirty="0"/>
+              <a:t>Remember that optional points for individual </a:t>
+            </a:r>
+            <a:r>
+              <a:rPr lang="en-US" sz="2200" dirty="0" err="1"/>
+              <a:t>homeworks</a:t>
+            </a:r>
+            <a:r>
+              <a:rPr lang="en-US" sz="2200" dirty="0"/>
+              <a:t> still </a:t>
+            </a:r>
+            <a:r>
+              <a:rPr lang="en-US" sz="2200" dirty="0" err="1"/>
+              <a:t>submittable</a:t>
+            </a:r>
+            <a:r>
+              <a:rPr lang="en-US" sz="2200" dirty="0"/>
+              <a:t> in OH through end of class (Nov. 24). You need to make progress on those if you are behind.</a:t>
+            </a:r>
+            <a:endParaRPr lang="en-US" sz="1800" dirty="0"/>
+          </a:p>
+          <a:p>
+            <a:endParaRPr lang="en-US" sz="2200" dirty="0"/>
+          </a:p>
+          <a:p>
+            <a:r>
+              <a:rPr lang="en-US" sz="2600" dirty="0"/>
+              <a:t>Remember: Get and read “reality is broken”, readings.</a:t>
+            </a:r>
+          </a:p>
+          <a:p>
+            <a:endParaRPr lang="en-US" sz="2200" dirty="0"/>
+          </a:p>
+          <a:p>
+            <a:r>
+              <a:rPr lang="en-US" sz="2200" dirty="0"/>
+              <a:t>Today: Finish level design and start action/interaction</a:t>
+            </a:r>
+            <a:endParaRPr lang="en-US" sz="1800" dirty="0"/>
+          </a:p>
+        </p:txBody>
+      </p:sp>
+      <p:sp>
+        <p:nvSpPr>
+          <p:cNvPr id="4" name="Footer Placeholder 3"/>
+          <p:cNvSpPr>
+            <a:spLocks noGrp="1"/>
+          </p:cNvSpPr>
+          <p:nvPr>
+            <p:ph type="ftr" sz="quarter" idx="10"/>
+          </p:nvPr>
+        </p:nvSpPr>
+        <p:spPr/>
+        <p:txBody>
+          <a:bodyPr/>
+          <a:lstStyle/>
+          <a:p>
+            <a:fld id="{D0357299-C40C-42AB-B0C0-2E6E0A5A7F61}" type="slidenum">
+              <a:rPr lang="en-US" altLang="zh-CN" smtClean="0"/>
+              <a:pPr/>
+              <a:t>21</a:t>
+            </a:fld>
+            <a:endParaRPr lang="en-US" altLang="zh-CN"/>
+          </a:p>
+        </p:txBody>
+      </p:sp>
+    </p:spTree>
+    <p:extLst>
+      <p:ext uri="{BB962C8B-B14F-4D97-AF65-F5344CB8AC3E}">
+        <p14:creationId xmlns:p14="http://schemas.microsoft.com/office/powerpoint/2010/main" val="1155351273"/>
       </p:ext>
     </p:extLst>
   </p:cSld>

</xml_diff>